<commit_message>
Subido todo el proyecto con comentarios
</commit_message>
<xml_diff>
--- a/Plantilla Práctica final.pptx
+++ b/Plantilla Práctica final.pptx
@@ -5,7 +5,7 @@
     <p:sldMasterId id="2147483648" r:id="rId4"/>
   </p:sldMasterIdLst>
   <p:notesMasterIdLst>
-    <p:notesMasterId r:id="rId22"/>
+    <p:notesMasterId r:id="rId25"/>
   </p:notesMasterIdLst>
   <p:sldIdLst>
     <p:sldId id="256" r:id="rId5"/>
@@ -23,46 +23,49 @@
     <p:sldId id="270" r:id="rId17"/>
     <p:sldId id="271" r:id="rId18"/>
     <p:sldId id="272" r:id="rId19"/>
-    <p:sldId id="260" r:id="rId20"/>
-    <p:sldId id="261" r:id="rId21"/>
+    <p:sldId id="273" r:id="rId20"/>
+    <p:sldId id="274" r:id="rId21"/>
+    <p:sldId id="275" r:id="rId22"/>
+    <p:sldId id="260" r:id="rId23"/>
+    <p:sldId id="261" r:id="rId24"/>
   </p:sldIdLst>
   <p:sldSz cx="9144000" cy="5143500" type="screen16x9"/>
   <p:notesSz cx="6858000" cy="9144000"/>
   <p:embeddedFontLst>
     <p:embeddedFont>
       <p:font typeface="Montserrat" panose="00000500000000000000" pitchFamily="2" charset="0"/>
-      <p:regular r:id="rId23"/>
-      <p:bold r:id="rId24"/>
-      <p:italic r:id="rId25"/>
-      <p:boldItalic r:id="rId26"/>
+      <p:regular r:id="rId26"/>
+      <p:bold r:id="rId27"/>
+      <p:italic r:id="rId28"/>
+      <p:boldItalic r:id="rId29"/>
     </p:embeddedFont>
     <p:embeddedFont>
       <p:font typeface="Montserrat Light" panose="00000400000000000000" pitchFamily="2" charset="0"/>
-      <p:regular r:id="rId27"/>
-      <p:bold r:id="rId28"/>
-      <p:italic r:id="rId29"/>
-      <p:boldItalic r:id="rId30"/>
+      <p:regular r:id="rId30"/>
+      <p:bold r:id="rId31"/>
+      <p:italic r:id="rId32"/>
+      <p:boldItalic r:id="rId33"/>
     </p:embeddedFont>
     <p:embeddedFont>
       <p:font typeface="Montserrat Medium" panose="00000600000000000000" pitchFamily="2" charset="0"/>
-      <p:regular r:id="rId31"/>
-      <p:bold r:id="rId32"/>
-      <p:italic r:id="rId33"/>
-      <p:boldItalic r:id="rId34"/>
+      <p:regular r:id="rId34"/>
+      <p:bold r:id="rId35"/>
+      <p:italic r:id="rId36"/>
+      <p:boldItalic r:id="rId37"/>
     </p:embeddedFont>
     <p:embeddedFont>
       <p:font typeface="Montserrat SemiBold" panose="00000700000000000000" pitchFamily="2" charset="0"/>
-      <p:regular r:id="rId35"/>
-      <p:bold r:id="rId36"/>
-      <p:italic r:id="rId37"/>
-      <p:boldItalic r:id="rId38"/>
+      <p:regular r:id="rId38"/>
+      <p:bold r:id="rId39"/>
+      <p:italic r:id="rId40"/>
+      <p:boldItalic r:id="rId41"/>
     </p:embeddedFont>
     <p:embeddedFont>
       <p:font typeface="Poppins Light" panose="00000400000000000000" pitchFamily="2" charset="0"/>
-      <p:regular r:id="rId39"/>
-      <p:bold r:id="rId40"/>
-      <p:italic r:id="rId41"/>
-      <p:boldItalic r:id="rId42"/>
+      <p:regular r:id="rId42"/>
+      <p:bold r:id="rId43"/>
+      <p:italic r:id="rId44"/>
+      <p:boldItalic r:id="rId45"/>
     </p:embeddedFont>
   </p:embeddedFontLst>
   <p:defaultTextStyle>
@@ -299,7 +302,7 @@
       <p15:sldGuideLst xmlns:p15="http://schemas.microsoft.com/office/powerpoint/2012/main"/>
     </p:ext>
     <p:ext uri="GoogleSlidesCustomDataVersion2">
-      <go:slidesCustomData xmlns="" xmlns:mc="http://schemas.openxmlformats.org/markup-compatibility/2006" xmlns:mv="urn:schemas-microsoft-com:mac:vml" xmlns:c="http://schemas.openxmlformats.org/drawingml/2006/chart" xmlns:dgm="http://schemas.openxmlformats.org/drawingml/2006/diagram" xmlns:o="urn:schemas-microsoft-com:office:office" xmlns:v="urn:schemas-microsoft-com:vml" xmlns:pvml="urn:schemas-microsoft-com:office:powerpoint" xmlns:com="http://schemas.openxmlformats.org/drawingml/2006/compatibility" xmlns:p14="http://schemas.microsoft.com/office/powerpoint/2010/main" xmlns:p15="http://schemas.microsoft.com/office/powerpoint/2012/main" xmlns:ahyp="http://schemas.microsoft.com/office/drawing/2018/hyperlinkcolor" xmlns:go="http://customooxmlschemas.google.com/" r:id="rId43" roundtripDataSignature="AMtx7mguE6bL8LJpFqR2QUUiYx8eneOe1w=="/>
+      <go:slidesCustomData xmlns="" xmlns:mc="http://schemas.openxmlformats.org/markup-compatibility/2006" xmlns:mv="urn:schemas-microsoft-com:mac:vml" xmlns:c="http://schemas.openxmlformats.org/drawingml/2006/chart" xmlns:dgm="http://schemas.openxmlformats.org/drawingml/2006/diagram" xmlns:o="urn:schemas-microsoft-com:office:office" xmlns:v="urn:schemas-microsoft-com:vml" xmlns:pvml="urn:schemas-microsoft-com:office:powerpoint" xmlns:com="http://schemas.openxmlformats.org/drawingml/2006/compatibility" xmlns:p14="http://schemas.microsoft.com/office/powerpoint/2010/main" xmlns:p15="http://schemas.microsoft.com/office/powerpoint/2012/main" xmlns:ahyp="http://schemas.microsoft.com/office/drawing/2018/hyperlinkcolor" xmlns:go="http://customooxmlschemas.google.com/" r:id="rId46" roundtripDataSignature="AMtx7mguE6bL8LJpFqR2QUUiYx8eneOe1w=="/>
     </p:ext>
   </p:extLst>
 </p:presentation>
@@ -7410,8 +7413,8 @@
         </p:nvSpPr>
         <p:spPr>
           <a:xfrm>
-            <a:off x="1143225" y="685800"/>
-            <a:ext cx="4572300" cy="3429000"/>
+            <a:off x="381000" y="685800"/>
+            <a:ext cx="6096000" cy="3429000"/>
           </a:xfrm>
           <a:custGeom>
             <a:avLst/>
@@ -7486,7 +7489,7 @@
         </p:nvSpPr>
         <p:spPr>
           <a:xfrm>
-            <a:off x="381300" y="685800"/>
+            <a:off x="381000" y="685800"/>
             <a:ext cx="6096000" cy="3429000"/>
           </a:xfrm>
           <a:custGeom>
@@ -7746,7 +7749,7 @@
         </p:nvSpPr>
         <p:spPr>
           <a:xfrm>
-            <a:off x="381300" y="685800"/>
+            <a:off x="381000" y="685800"/>
             <a:ext cx="6096000" cy="3429000"/>
           </a:xfrm>
           <a:custGeom>
@@ -7876,7 +7879,7 @@
         </p:nvSpPr>
         <p:spPr>
           <a:xfrm>
-            <a:off x="381300" y="685800"/>
+            <a:off x="381000" y="685800"/>
             <a:ext cx="6096000" cy="3429000"/>
           </a:xfrm>
           <a:custGeom>
@@ -9597,301 +9600,6 @@
 </file>
 
 <file path=ppt/slideLayouts/slideLayout14.xml><?xml version="1.0" encoding="utf-8"?>
-<p:sldLayout xmlns:a="http://schemas.openxmlformats.org/drawingml/2006/main" xmlns:r="http://schemas.openxmlformats.org/officeDocument/2006/relationships" xmlns:p="http://schemas.openxmlformats.org/presentationml/2006/main" matchingName="12_Contents slide layout 1">
-  <p:cSld name="12_Contents slide layout_1">
-    <p:bg>
-      <p:bgPr>
-        <a:blipFill>
-          <a:blip r:embed="rId2">
-            <a:alphaModFix/>
-          </a:blip>
-          <a:stretch>
-            <a:fillRect/>
-          </a:stretch>
-        </a:blipFill>
-        <a:effectLst/>
-      </p:bgPr>
-    </p:bg>
-    <p:spTree>
-      <p:nvGrpSpPr>
-        <p:cNvPr id="1" name="Shape 106"/>
-        <p:cNvGrpSpPr/>
-        <p:nvPr/>
-      </p:nvGrpSpPr>
-      <p:grpSpPr>
-        <a:xfrm>
-          <a:off x="0" y="0"/>
-          <a:ext cx="0" cy="0"/>
-          <a:chOff x="0" y="0"/>
-          <a:chExt cx="0" cy="0"/>
-        </a:xfrm>
-      </p:grpSpPr>
-      <p:sp>
-        <p:nvSpPr>
-          <p:cNvPr id="107" name="Google Shape;107;p21"/>
-          <p:cNvSpPr/>
-          <p:nvPr/>
-        </p:nvSpPr>
-        <p:spPr>
-          <a:xfrm>
-            <a:off x="0" y="0"/>
-            <a:ext cx="9144000" cy="5143500"/>
-          </a:xfrm>
-          <a:prstGeom prst="rect">
-            <a:avLst/>
-          </a:prstGeom>
-          <a:solidFill>
-            <a:srgbClr val="000000">
-              <a:alpha val="29803"/>
-            </a:srgbClr>
-          </a:solidFill>
-          <a:ln>
-            <a:noFill/>
-          </a:ln>
-        </p:spPr>
-        <p:txBody>
-          <a:bodyPr spcFirstLastPara="1" wrap="square" lIns="91425" tIns="91425" rIns="91425" bIns="91425" anchor="ctr" anchorCtr="0">
-            <a:noAutofit/>
-          </a:bodyPr>
-          <a:lstStyle/>
-          <a:p>
-            <a:pPr marL="0" marR="0" lvl="0" indent="0" algn="l" rtl="0">
-              <a:lnSpc>
-                <a:spcPct val="100000"/>
-              </a:lnSpc>
-              <a:spcBef>
-                <a:spcPts val="0"/>
-              </a:spcBef>
-              <a:spcAft>
-                <a:spcPts val="0"/>
-              </a:spcAft>
-              <a:buClr>
-                <a:srgbClr val="000000"/>
-              </a:buClr>
-              <a:buSzPts val="1400"/>
-              <a:buFont typeface="Arial"/>
-              <a:buNone/>
-            </a:pPr>
-            <a:endParaRPr sz="1400" b="0" i="0" u="none" strike="noStrike" cap="none">
-              <a:solidFill>
-                <a:srgbClr val="000000"/>
-              </a:solidFill>
-              <a:latin typeface="Arial"/>
-              <a:ea typeface="Arial"/>
-              <a:cs typeface="Arial"/>
-              <a:sym typeface="Arial"/>
-            </a:endParaRPr>
-          </a:p>
-        </p:txBody>
-      </p:sp>
-      <p:pic>
-        <p:nvPicPr>
-          <p:cNvPr id="108" name="Google Shape;108;p21"/>
-          <p:cNvPicPr preferRelativeResize="0"/>
-          <p:nvPr/>
-        </p:nvPicPr>
-        <p:blipFill rotWithShape="1">
-          <a:blip r:embed="rId3">
-            <a:alphaModFix/>
-          </a:blip>
-          <a:srcRect/>
-          <a:stretch/>
-        </p:blipFill>
-        <p:spPr>
-          <a:xfrm>
-            <a:off x="7539875" y="149550"/>
-            <a:ext cx="1433750" cy="453066"/>
-          </a:xfrm>
-          <a:prstGeom prst="rect">
-            <a:avLst/>
-          </a:prstGeom>
-          <a:noFill/>
-          <a:ln>
-            <a:noFill/>
-          </a:ln>
-        </p:spPr>
-      </p:pic>
-      <p:sp>
-        <p:nvSpPr>
-          <p:cNvPr id="109" name="Google Shape;109;p21"/>
-          <p:cNvSpPr txBox="1"/>
-          <p:nvPr/>
-        </p:nvSpPr>
-        <p:spPr>
-          <a:xfrm>
-            <a:off x="8824925" y="4851125"/>
-            <a:ext cx="319200" cy="292500"/>
-          </a:xfrm>
-          <a:prstGeom prst="rect">
-            <a:avLst/>
-          </a:prstGeom>
-          <a:solidFill>
-            <a:srgbClr val="0E57C4"/>
-          </a:solidFill>
-          <a:ln>
-            <a:noFill/>
-          </a:ln>
-        </p:spPr>
-        <p:txBody>
-          <a:bodyPr spcFirstLastPara="1" wrap="square" lIns="91425" tIns="91425" rIns="91425" bIns="91425" anchor="ctr" anchorCtr="0">
-            <a:noAutofit/>
-          </a:bodyPr>
-          <a:lstStyle/>
-          <a:p>
-            <a:pPr marL="0" marR="0" lvl="0" indent="0" algn="ctr" rtl="0">
-              <a:lnSpc>
-                <a:spcPct val="100000"/>
-              </a:lnSpc>
-              <a:spcBef>
-                <a:spcPts val="0"/>
-              </a:spcBef>
-              <a:spcAft>
-                <a:spcPts val="0"/>
-              </a:spcAft>
-              <a:buClr>
-                <a:srgbClr val="000000"/>
-              </a:buClr>
-              <a:buSzPts val="1400"/>
-              <a:buFont typeface="Arial"/>
-              <a:buNone/>
-            </a:pPr>
-            <a:fld id="{00000000-1234-1234-1234-123412341234}" type="slidenum">
-              <a:rPr lang="es-ES" sz="900" b="0" i="0" u="none" strike="noStrike" cap="none">
-                <a:solidFill>
-                  <a:srgbClr val="FFFFFF"/>
-                </a:solidFill>
-                <a:latin typeface="Arial"/>
-                <a:ea typeface="Arial"/>
-                <a:cs typeface="Arial"/>
-                <a:sym typeface="Arial"/>
-              </a:rPr>
-              <a:t>‹Nº›</a:t>
-            </a:fld>
-            <a:endParaRPr sz="900" b="0" i="0" u="none" strike="noStrike" cap="none">
-              <a:solidFill>
-                <a:srgbClr val="FFFFFF"/>
-              </a:solidFill>
-              <a:latin typeface="Arial"/>
-              <a:ea typeface="Arial"/>
-              <a:cs typeface="Arial"/>
-              <a:sym typeface="Arial"/>
-            </a:endParaRPr>
-          </a:p>
-        </p:txBody>
-      </p:sp>
-      <p:cxnSp>
-        <p:nvCxnSpPr>
-          <p:cNvPr id="110" name="Google Shape;110;p21"/>
-          <p:cNvCxnSpPr/>
-          <p:nvPr/>
-        </p:nvCxnSpPr>
-        <p:spPr>
-          <a:xfrm>
-            <a:off x="0" y="279550"/>
-            <a:ext cx="411300" cy="0"/>
-          </a:xfrm>
-          <a:prstGeom prst="straightConnector1">
-            <a:avLst/>
-          </a:prstGeom>
-          <a:noFill/>
-          <a:ln w="9525" cap="flat" cmpd="sng">
-            <a:solidFill>
-              <a:srgbClr val="FDFDFD"/>
-            </a:solidFill>
-            <a:prstDash val="solid"/>
-            <a:round/>
-            <a:headEnd type="none" w="sm" len="sm"/>
-            <a:tailEnd type="none" w="sm" len="sm"/>
-          </a:ln>
-        </p:spPr>
-      </p:cxnSp>
-      <p:sp>
-        <p:nvSpPr>
-          <p:cNvPr id="111" name="Google Shape;111;p21"/>
-          <p:cNvSpPr txBox="1"/>
-          <p:nvPr/>
-        </p:nvSpPr>
-        <p:spPr>
-          <a:xfrm>
-            <a:off x="411300" y="119525"/>
-            <a:ext cx="2687400" cy="292500"/>
-          </a:xfrm>
-          <a:prstGeom prst="rect">
-            <a:avLst/>
-          </a:prstGeom>
-          <a:noFill/>
-          <a:ln>
-            <a:noFill/>
-          </a:ln>
-        </p:spPr>
-        <p:txBody>
-          <a:bodyPr spcFirstLastPara="1" wrap="square" lIns="91425" tIns="91425" rIns="91425" bIns="91425" anchor="t" anchorCtr="0">
-            <a:spAutoFit/>
-          </a:bodyPr>
-          <a:lstStyle/>
-          <a:p>
-            <a:pPr marL="0" marR="0" lvl="0" indent="0" algn="l" rtl="0">
-              <a:lnSpc>
-                <a:spcPct val="100000"/>
-              </a:lnSpc>
-              <a:spcBef>
-                <a:spcPts val="0"/>
-              </a:spcBef>
-              <a:spcAft>
-                <a:spcPts val="0"/>
-              </a:spcAft>
-              <a:buClr>
-                <a:srgbClr val="000000"/>
-              </a:buClr>
-              <a:buSzPts val="1100"/>
-              <a:buFont typeface="Arial"/>
-              <a:buNone/>
-            </a:pPr>
-            <a:r>
-              <a:rPr lang="es-ES" sz="700" b="1" i="0" u="none" strike="noStrike" cap="none">
-                <a:solidFill>
-                  <a:srgbClr val="FFFFFF"/>
-                </a:solidFill>
-                <a:latin typeface="Montserrat"/>
-                <a:ea typeface="Montserrat"/>
-                <a:cs typeface="Montserrat"/>
-                <a:sym typeface="Montserrat"/>
-              </a:rPr>
-              <a:t>Future Space  | </a:t>
-            </a:r>
-            <a:r>
-              <a:rPr lang="es-ES" sz="700" b="0" i="0" u="none" strike="noStrike" cap="none">
-                <a:solidFill>
-                  <a:schemeClr val="lt1"/>
-                </a:solidFill>
-                <a:latin typeface="Montserrat Medium"/>
-                <a:ea typeface="Montserrat Medium"/>
-                <a:cs typeface="Montserrat Medium"/>
-                <a:sym typeface="Montserrat Medium"/>
-              </a:rPr>
-              <a:t>Donde el futuro se hace presente</a:t>
-            </a:r>
-            <a:endParaRPr sz="700" b="0" i="0" u="none" strike="noStrike" cap="none">
-              <a:solidFill>
-                <a:srgbClr val="FFFFFF"/>
-              </a:solidFill>
-              <a:latin typeface="Montserrat Medium"/>
-              <a:ea typeface="Montserrat Medium"/>
-              <a:cs typeface="Montserrat Medium"/>
-              <a:sym typeface="Montserrat Medium"/>
-            </a:endParaRPr>
-          </a:p>
-        </p:txBody>
-      </p:sp>
-    </p:spTree>
-  </p:cSld>
-  <p:clrMapOvr>
-    <a:masterClrMapping/>
-  </p:clrMapOvr>
-</p:sldLayout>
-</file>
-
-<file path=ppt/slideLayouts/slideLayout15.xml><?xml version="1.0" encoding="utf-8"?>
 <p:sldLayout xmlns:a="http://schemas.openxmlformats.org/drawingml/2006/main" xmlns:r="http://schemas.openxmlformats.org/officeDocument/2006/relationships" xmlns:p="http://schemas.openxmlformats.org/presentationml/2006/main" matchingName="16_Contents slide layout 1 1">
   <p:cSld name="16_Contents slide layout_1_1">
     <p:bg>
@@ -10213,7 +9921,7 @@
 </p:sldLayout>
 </file>
 
-<file path=ppt/slideLayouts/slideLayout16.xml><?xml version="1.0" encoding="utf-8"?>
+<file path=ppt/slideLayouts/slideLayout15.xml><?xml version="1.0" encoding="utf-8"?>
 <p:sldLayout xmlns:a="http://schemas.openxmlformats.org/drawingml/2006/main" xmlns:r="http://schemas.openxmlformats.org/officeDocument/2006/relationships" xmlns:p="http://schemas.openxmlformats.org/presentationml/2006/main" matchingName="16_Contents slide layout 1 1 1">
   <p:cSld name="16_Contents slide layout_1_1_1">
     <p:bg>
@@ -10535,7 +10243,7 @@
 </p:sldLayout>
 </file>
 
-<file path=ppt/slideLayouts/slideLayout17.xml><?xml version="1.0" encoding="utf-8"?>
+<file path=ppt/slideLayouts/slideLayout16.xml><?xml version="1.0" encoding="utf-8"?>
 <p:sldLayout xmlns:a="http://schemas.openxmlformats.org/drawingml/2006/main" xmlns:r="http://schemas.openxmlformats.org/officeDocument/2006/relationships" xmlns:p="http://schemas.openxmlformats.org/presentationml/2006/main" matchingName="16_Contents slide layout 1 1 1 1">
   <p:cSld name="16_Contents slide layout_1_1_1_1">
     <p:bg>
@@ -10857,7 +10565,7 @@
 </p:sldLayout>
 </file>
 
-<file path=ppt/slideLayouts/slideLayout18.xml><?xml version="1.0" encoding="utf-8"?>
+<file path=ppt/slideLayouts/slideLayout17.xml><?xml version="1.0" encoding="utf-8"?>
 <p:sldLayout xmlns:a="http://schemas.openxmlformats.org/drawingml/2006/main" xmlns:r="http://schemas.openxmlformats.org/officeDocument/2006/relationships" xmlns:p="http://schemas.openxmlformats.org/presentationml/2006/main" matchingName="12_Contents slide layout 2">
   <p:cSld name="12_Contents slide layout_2">
     <p:bg>
@@ -11179,7 +10887,7 @@
 </p:sldLayout>
 </file>
 
-<file path=ppt/slideLayouts/slideLayout19.xml><?xml version="1.0" encoding="utf-8"?>
+<file path=ppt/slideLayouts/slideLayout18.xml><?xml version="1.0" encoding="utf-8"?>
 <p:sldLayout xmlns:a="http://schemas.openxmlformats.org/drawingml/2006/main" xmlns:r="http://schemas.openxmlformats.org/officeDocument/2006/relationships" xmlns:p="http://schemas.openxmlformats.org/presentationml/2006/main" matchingName="Diapositiva con título 1 1 2 1">
   <p:cSld name="TITLE_1_1_2_1">
     <p:spTree>
@@ -14537,12 +14245,11 @@
     <p:sldLayoutId id="2147483659" r:id="rId11"/>
     <p:sldLayoutId id="2147483660" r:id="rId12"/>
     <p:sldLayoutId id="2147483661" r:id="rId13"/>
-    <p:sldLayoutId id="2147483662" r:id="rId14"/>
-    <p:sldLayoutId id="2147483663" r:id="rId15"/>
-    <p:sldLayoutId id="2147483664" r:id="rId16"/>
-    <p:sldLayoutId id="2147483665" r:id="rId17"/>
-    <p:sldLayoutId id="2147483666" r:id="rId18"/>
-    <p:sldLayoutId id="2147483667" r:id="rId19"/>
+    <p:sldLayoutId id="2147483663" r:id="rId14"/>
+    <p:sldLayoutId id="2147483664" r:id="rId15"/>
+    <p:sldLayoutId id="2147483665" r:id="rId16"/>
+    <p:sldLayoutId id="2147483666" r:id="rId17"/>
+    <p:sldLayoutId id="2147483667" r:id="rId18"/>
   </p:sldLayoutIdLst>
   <p:hf hdr="0" ftr="0" dt="0"/>
   <p:txStyles>
@@ -16048,6 +15755,410 @@
   <p:cSld>
     <p:spTree>
       <p:nvGrpSpPr>
+        <p:cNvPr id="1" name=""/>
+        <p:cNvGrpSpPr/>
+        <p:nvPr/>
+      </p:nvGrpSpPr>
+      <p:grpSpPr>
+        <a:xfrm>
+          <a:off x="0" y="0"/>
+          <a:ext cx="0" cy="0"/>
+          <a:chOff x="0" y="0"/>
+          <a:chExt cx="0" cy="0"/>
+        </a:xfrm>
+      </p:grpSpPr>
+      <p:sp>
+        <p:nvSpPr>
+          <p:cNvPr id="2" name="CuadroTexto 1">
+            <a:extLst>
+              <a:ext uri="{FF2B5EF4-FFF2-40B4-BE49-F238E27FC236}">
+                <a16:creationId xmlns:a16="http://schemas.microsoft.com/office/drawing/2014/main" id="{911B8546-9CB6-5B6F-91A0-7CB93D7564CC}"/>
+              </a:ext>
+            </a:extLst>
+          </p:cNvPr>
+          <p:cNvSpPr txBox="1"/>
+          <p:nvPr/>
+        </p:nvSpPr>
+        <p:spPr>
+          <a:xfrm>
+            <a:off x="645885" y="2010228"/>
+            <a:ext cx="2672526" cy="646331"/>
+          </a:xfrm>
+          <a:prstGeom prst="rect">
+            <a:avLst/>
+          </a:prstGeom>
+          <a:noFill/>
+        </p:spPr>
+        <p:txBody>
+          <a:bodyPr wrap="none" rtlCol="0">
+            <a:spAutoFit/>
+          </a:bodyPr>
+          <a:lstStyle/>
+          <a:p>
+            <a:r>
+              <a:rPr lang="es-ES_tradnl" sz="3600" dirty="0">
+                <a:solidFill>
+                  <a:schemeClr val="bg1"/>
+                </a:solidFill>
+              </a:rPr>
+              <a:t>Estadísticas</a:t>
+            </a:r>
+            <a:endParaRPr lang="es-ES" sz="3600" dirty="0">
+              <a:solidFill>
+                <a:schemeClr val="bg1"/>
+              </a:solidFill>
+            </a:endParaRPr>
+          </a:p>
+        </p:txBody>
+      </p:sp>
+    </p:spTree>
+    <p:extLst>
+      <p:ext uri="{BB962C8B-B14F-4D97-AF65-F5344CB8AC3E}">
+        <p14:creationId xmlns:p14="http://schemas.microsoft.com/office/powerpoint/2010/main" val="540986265"/>
+      </p:ext>
+    </p:extLst>
+  </p:cSld>
+  <p:clrMapOvr>
+    <a:masterClrMapping/>
+  </p:clrMapOvr>
+</p:sld>
+</file>
+
+<file path=ppt/slides/slide17.xml><?xml version="1.0" encoding="utf-8"?>
+<p:sld xmlns:a="http://schemas.openxmlformats.org/drawingml/2006/main" xmlns:r="http://schemas.openxmlformats.org/officeDocument/2006/relationships" xmlns:p="http://schemas.openxmlformats.org/presentationml/2006/main">
+  <p:cSld>
+    <p:spTree>
+      <p:nvGrpSpPr>
+        <p:cNvPr id="1" name=""/>
+        <p:cNvGrpSpPr/>
+        <p:nvPr/>
+      </p:nvGrpSpPr>
+      <p:grpSpPr>
+        <a:xfrm>
+          <a:off x="0" y="0"/>
+          <a:ext cx="0" cy="0"/>
+          <a:chOff x="0" y="0"/>
+          <a:chExt cx="0" cy="0"/>
+        </a:xfrm>
+      </p:grpSpPr>
+      <p:pic>
+        <p:nvPicPr>
+          <p:cNvPr id="3" name="Imagen 2">
+            <a:extLst>
+              <a:ext uri="{FF2B5EF4-FFF2-40B4-BE49-F238E27FC236}">
+                <a16:creationId xmlns:a16="http://schemas.microsoft.com/office/drawing/2014/main" id="{395D654A-BEC0-EA8D-61DB-E3B5E2B1A39E}"/>
+              </a:ext>
+            </a:extLst>
+          </p:cNvPr>
+          <p:cNvPicPr>
+            <a:picLocks noChangeAspect="1"/>
+          </p:cNvPicPr>
+          <p:nvPr/>
+        </p:nvPicPr>
+        <p:blipFill>
+          <a:blip r:embed="rId2"/>
+          <a:stretch>
+            <a:fillRect/>
+          </a:stretch>
+        </p:blipFill>
+        <p:spPr>
+          <a:xfrm>
+            <a:off x="1012702" y="413077"/>
+            <a:ext cx="2427183" cy="2158673"/>
+          </a:xfrm>
+          <a:prstGeom prst="rect">
+            <a:avLst/>
+          </a:prstGeom>
+        </p:spPr>
+      </p:pic>
+      <p:pic>
+        <p:nvPicPr>
+          <p:cNvPr id="5" name="Imagen 4">
+            <a:extLst>
+              <a:ext uri="{FF2B5EF4-FFF2-40B4-BE49-F238E27FC236}">
+                <a16:creationId xmlns:a16="http://schemas.microsoft.com/office/drawing/2014/main" id="{3D3800F0-66A8-89A4-4438-D09DDA7665C6}"/>
+              </a:ext>
+            </a:extLst>
+          </p:cNvPr>
+          <p:cNvPicPr>
+            <a:picLocks noChangeAspect="1"/>
+          </p:cNvPicPr>
+          <p:nvPr/>
+        </p:nvPicPr>
+        <p:blipFill>
+          <a:blip r:embed="rId3"/>
+          <a:stretch>
+            <a:fillRect/>
+          </a:stretch>
+        </p:blipFill>
+        <p:spPr>
+          <a:xfrm>
+            <a:off x="1003570" y="2899684"/>
+            <a:ext cx="2436315" cy="2158673"/>
+          </a:xfrm>
+          <a:prstGeom prst="rect">
+            <a:avLst/>
+          </a:prstGeom>
+        </p:spPr>
+      </p:pic>
+      <p:pic>
+        <p:nvPicPr>
+          <p:cNvPr id="7" name="Imagen 6">
+            <a:extLst>
+              <a:ext uri="{FF2B5EF4-FFF2-40B4-BE49-F238E27FC236}">
+                <a16:creationId xmlns:a16="http://schemas.microsoft.com/office/drawing/2014/main" id="{629F1D98-BD39-09F4-5706-B2AD820397AA}"/>
+              </a:ext>
+            </a:extLst>
+          </p:cNvPr>
+          <p:cNvPicPr>
+            <a:picLocks noChangeAspect="1"/>
+          </p:cNvPicPr>
+          <p:nvPr/>
+        </p:nvPicPr>
+        <p:blipFill>
+          <a:blip r:embed="rId4"/>
+          <a:stretch>
+            <a:fillRect/>
+          </a:stretch>
+        </p:blipFill>
+        <p:spPr>
+          <a:xfrm>
+            <a:off x="4957480" y="413077"/>
+            <a:ext cx="2691725" cy="2158673"/>
+          </a:xfrm>
+          <a:prstGeom prst="rect">
+            <a:avLst/>
+          </a:prstGeom>
+        </p:spPr>
+      </p:pic>
+      <p:pic>
+        <p:nvPicPr>
+          <p:cNvPr id="9" name="Imagen 8">
+            <a:extLst>
+              <a:ext uri="{FF2B5EF4-FFF2-40B4-BE49-F238E27FC236}">
+                <a16:creationId xmlns:a16="http://schemas.microsoft.com/office/drawing/2014/main" id="{8799092E-C12D-30EC-245A-5AC6292D91B5}"/>
+              </a:ext>
+            </a:extLst>
+          </p:cNvPr>
+          <p:cNvPicPr>
+            <a:picLocks noChangeAspect="1"/>
+          </p:cNvPicPr>
+          <p:nvPr/>
+        </p:nvPicPr>
+        <p:blipFill>
+          <a:blip r:embed="rId5"/>
+          <a:stretch>
+            <a:fillRect/>
+          </a:stretch>
+        </p:blipFill>
+        <p:spPr>
+          <a:xfrm>
+            <a:off x="4920206" y="2899684"/>
+            <a:ext cx="2766271" cy="2158673"/>
+          </a:xfrm>
+          <a:prstGeom prst="rect">
+            <a:avLst/>
+          </a:prstGeom>
+        </p:spPr>
+      </p:pic>
+    </p:spTree>
+    <p:extLst>
+      <p:ext uri="{BB962C8B-B14F-4D97-AF65-F5344CB8AC3E}">
+        <p14:creationId xmlns:p14="http://schemas.microsoft.com/office/powerpoint/2010/main" val="3678055342"/>
+      </p:ext>
+    </p:extLst>
+  </p:cSld>
+  <p:clrMapOvr>
+    <a:masterClrMapping/>
+  </p:clrMapOvr>
+</p:sld>
+</file>
+
+<file path=ppt/slides/slide18.xml><?xml version="1.0" encoding="utf-8"?>
+<p:sld xmlns:a="http://schemas.openxmlformats.org/drawingml/2006/main" xmlns:r="http://schemas.openxmlformats.org/officeDocument/2006/relationships" xmlns:p="http://schemas.openxmlformats.org/presentationml/2006/main">
+  <p:cSld>
+    <p:spTree>
+      <p:nvGrpSpPr>
+        <p:cNvPr id="1" name=""/>
+        <p:cNvGrpSpPr/>
+        <p:nvPr/>
+      </p:nvGrpSpPr>
+      <p:grpSpPr>
+        <a:xfrm>
+          <a:off x="0" y="0"/>
+          <a:ext cx="0" cy="0"/>
+          <a:chOff x="0" y="0"/>
+          <a:chExt cx="0" cy="0"/>
+        </a:xfrm>
+      </p:grpSpPr>
+      <p:pic>
+        <p:nvPicPr>
+          <p:cNvPr id="3" name="Imagen 2">
+            <a:extLst>
+              <a:ext uri="{FF2B5EF4-FFF2-40B4-BE49-F238E27FC236}">
+                <a16:creationId xmlns:a16="http://schemas.microsoft.com/office/drawing/2014/main" id="{4628A3B2-0F19-7A01-DA58-D927A06D9BE4}"/>
+              </a:ext>
+            </a:extLst>
+          </p:cNvPr>
+          <p:cNvPicPr>
+            <a:picLocks noChangeAspect="1"/>
+          </p:cNvPicPr>
+          <p:nvPr/>
+        </p:nvPicPr>
+        <p:blipFill>
+          <a:blip r:embed="rId2"/>
+          <a:stretch>
+            <a:fillRect/>
+          </a:stretch>
+        </p:blipFill>
+        <p:spPr>
+          <a:xfrm>
+            <a:off x="1233942" y="440549"/>
+            <a:ext cx="2118858" cy="2131201"/>
+          </a:xfrm>
+          <a:prstGeom prst="rect">
+            <a:avLst/>
+          </a:prstGeom>
+        </p:spPr>
+      </p:pic>
+      <p:pic>
+        <p:nvPicPr>
+          <p:cNvPr id="5" name="Imagen 4">
+            <a:extLst>
+              <a:ext uri="{FF2B5EF4-FFF2-40B4-BE49-F238E27FC236}">
+                <a16:creationId xmlns:a16="http://schemas.microsoft.com/office/drawing/2014/main" id="{25E8AAE4-D3A9-94DE-CB3F-483F28D1BD73}"/>
+              </a:ext>
+            </a:extLst>
+          </p:cNvPr>
+          <p:cNvPicPr>
+            <a:picLocks noChangeAspect="1"/>
+          </p:cNvPicPr>
+          <p:nvPr/>
+        </p:nvPicPr>
+        <p:blipFill>
+          <a:blip r:embed="rId3"/>
+          <a:stretch>
+            <a:fillRect/>
+          </a:stretch>
+        </p:blipFill>
+        <p:spPr>
+          <a:xfrm>
+            <a:off x="3630633" y="440547"/>
+            <a:ext cx="2667727" cy="2131201"/>
+          </a:xfrm>
+          <a:prstGeom prst="rect">
+            <a:avLst/>
+          </a:prstGeom>
+        </p:spPr>
+      </p:pic>
+      <p:pic>
+        <p:nvPicPr>
+          <p:cNvPr id="7" name="Imagen 6">
+            <a:extLst>
+              <a:ext uri="{FF2B5EF4-FFF2-40B4-BE49-F238E27FC236}">
+                <a16:creationId xmlns:a16="http://schemas.microsoft.com/office/drawing/2014/main" id="{D3143062-5C3D-1BB7-FF60-93911B4F833A}"/>
+              </a:ext>
+            </a:extLst>
+          </p:cNvPr>
+          <p:cNvPicPr>
+            <a:picLocks noChangeAspect="1"/>
+          </p:cNvPicPr>
+          <p:nvPr/>
+        </p:nvPicPr>
+        <p:blipFill>
+          <a:blip r:embed="rId4"/>
+          <a:stretch>
+            <a:fillRect/>
+          </a:stretch>
+        </p:blipFill>
+        <p:spPr>
+          <a:xfrm>
+            <a:off x="6423794" y="1194668"/>
+            <a:ext cx="2667727" cy="622958"/>
+          </a:xfrm>
+          <a:prstGeom prst="rect">
+            <a:avLst/>
+          </a:prstGeom>
+        </p:spPr>
+      </p:pic>
+      <p:pic>
+        <p:nvPicPr>
+          <p:cNvPr id="9" name="Imagen 8">
+            <a:extLst>
+              <a:ext uri="{FF2B5EF4-FFF2-40B4-BE49-F238E27FC236}">
+                <a16:creationId xmlns:a16="http://schemas.microsoft.com/office/drawing/2014/main" id="{367DC263-A6BE-FA06-8CBC-4AAA23B14663}"/>
+              </a:ext>
+            </a:extLst>
+          </p:cNvPr>
+          <p:cNvPicPr>
+            <a:picLocks noChangeAspect="1"/>
+          </p:cNvPicPr>
+          <p:nvPr/>
+        </p:nvPicPr>
+        <p:blipFill>
+          <a:blip r:embed="rId5"/>
+          <a:stretch>
+            <a:fillRect/>
+          </a:stretch>
+        </p:blipFill>
+        <p:spPr>
+          <a:xfrm>
+            <a:off x="2140219" y="2923456"/>
+            <a:ext cx="2431781" cy="1998533"/>
+          </a:xfrm>
+          <a:prstGeom prst="rect">
+            <a:avLst/>
+          </a:prstGeom>
+        </p:spPr>
+      </p:pic>
+      <p:pic>
+        <p:nvPicPr>
+          <p:cNvPr id="11" name="Imagen 10">
+            <a:extLst>
+              <a:ext uri="{FF2B5EF4-FFF2-40B4-BE49-F238E27FC236}">
+                <a16:creationId xmlns:a16="http://schemas.microsoft.com/office/drawing/2014/main" id="{EDBE9F0B-24E9-9E8F-9CEC-7FD4B83A2D6B}"/>
+              </a:ext>
+            </a:extLst>
+          </p:cNvPr>
+          <p:cNvPicPr>
+            <a:picLocks noChangeAspect="1"/>
+          </p:cNvPicPr>
+          <p:nvPr/>
+        </p:nvPicPr>
+        <p:blipFill>
+          <a:blip r:embed="rId6"/>
+          <a:stretch>
+            <a:fillRect/>
+          </a:stretch>
+        </p:blipFill>
+        <p:spPr>
+          <a:xfrm>
+            <a:off x="4995576" y="2701946"/>
+            <a:ext cx="2605567" cy="2441554"/>
+          </a:xfrm>
+          <a:prstGeom prst="rect">
+            <a:avLst/>
+          </a:prstGeom>
+        </p:spPr>
+      </p:pic>
+    </p:spTree>
+    <p:extLst>
+      <p:ext uri="{BB962C8B-B14F-4D97-AF65-F5344CB8AC3E}">
+        <p14:creationId xmlns:p14="http://schemas.microsoft.com/office/powerpoint/2010/main" val="2115522523"/>
+      </p:ext>
+    </p:extLst>
+  </p:cSld>
+  <p:clrMapOvr>
+    <a:masterClrMapping/>
+  </p:clrMapOvr>
+</p:sld>
+</file>
+
+<file path=ppt/slides/slide19.xml><?xml version="1.0" encoding="utf-8"?>
+<p:sld xmlns:a="http://schemas.openxmlformats.org/drawingml/2006/main" xmlns:r="http://schemas.openxmlformats.org/officeDocument/2006/relationships" xmlns:p="http://schemas.openxmlformats.org/presentationml/2006/main">
+  <p:cSld>
+    <p:spTree>
+      <p:nvGrpSpPr>
         <p:cNvPr id="1" name="Shape 193"/>
         <p:cNvGrpSpPr/>
         <p:nvPr/>
@@ -16068,7 +16179,697 @@
 </p:sld>
 </file>
 
-<file path=ppt/slides/slide17.xml><?xml version="1.0" encoding="utf-8"?>
+<file path=ppt/slides/slide2.xml><?xml version="1.0" encoding="utf-8"?>
+<p:sld xmlns:a="http://schemas.openxmlformats.org/drawingml/2006/main" xmlns:r="http://schemas.openxmlformats.org/officeDocument/2006/relationships" xmlns:p="http://schemas.openxmlformats.org/presentationml/2006/main">
+  <p:cSld>
+    <p:spTree>
+      <p:nvGrpSpPr>
+        <p:cNvPr id="1" name="Shape 169"/>
+        <p:cNvGrpSpPr/>
+        <p:nvPr/>
+      </p:nvGrpSpPr>
+      <p:grpSpPr>
+        <a:xfrm>
+          <a:off x="0" y="0"/>
+          <a:ext cx="0" cy="0"/>
+          <a:chOff x="0" y="0"/>
+          <a:chExt cx="0" cy="0"/>
+        </a:xfrm>
+      </p:grpSpPr>
+      <p:grpSp>
+        <p:nvGrpSpPr>
+          <p:cNvPr id="170" name="Google Shape;170;p2"/>
+          <p:cNvGrpSpPr/>
+          <p:nvPr/>
+        </p:nvGrpSpPr>
+        <p:grpSpPr>
+          <a:xfrm>
+            <a:off x="0" y="389900"/>
+            <a:ext cx="7170025" cy="754293"/>
+            <a:chOff x="0" y="1394669"/>
+            <a:chExt cx="7170025" cy="933300"/>
+          </a:xfrm>
+        </p:grpSpPr>
+        <p:sp>
+          <p:nvSpPr>
+            <p:cNvPr id="171" name="Google Shape;171;p2"/>
+            <p:cNvSpPr txBox="1"/>
+            <p:nvPr/>
+          </p:nvSpPr>
+          <p:spPr>
+            <a:xfrm>
+              <a:off x="459325" y="1394669"/>
+              <a:ext cx="6710700" cy="933300"/>
+            </a:xfrm>
+            <a:prstGeom prst="rect">
+              <a:avLst/>
+            </a:prstGeom>
+            <a:noFill/>
+            <a:ln>
+              <a:noFill/>
+            </a:ln>
+          </p:spPr>
+          <p:txBody>
+            <a:bodyPr spcFirstLastPara="1" wrap="square" lIns="91425" tIns="91425" rIns="91425" bIns="91425" anchor="ctr" anchorCtr="0">
+              <a:noAutofit/>
+            </a:bodyPr>
+            <a:lstStyle/>
+            <a:p>
+              <a:pPr marL="0" marR="0" lvl="0" indent="0" algn="l" rtl="0">
+                <a:lnSpc>
+                  <a:spcPct val="115000"/>
+                </a:lnSpc>
+                <a:spcBef>
+                  <a:spcPts val="0"/>
+                </a:spcBef>
+                <a:spcAft>
+                  <a:spcPts val="0"/>
+                </a:spcAft>
+                <a:buClr>
+                  <a:schemeClr val="dk1"/>
+                </a:buClr>
+                <a:buSzPts val="1800"/>
+                <a:buFont typeface="Arial"/>
+                <a:buNone/>
+              </a:pPr>
+              <a:r>
+                <a:rPr lang="es-ES" sz="2000" b="1" i="0" u="none" strike="noStrike" cap="none">
+                  <a:solidFill>
+                    <a:schemeClr val="lt1"/>
+                  </a:solidFill>
+                  <a:latin typeface="Montserrat"/>
+                  <a:ea typeface="Montserrat"/>
+                  <a:cs typeface="Montserrat"/>
+                  <a:sym typeface="Montserrat"/>
+                </a:rPr>
+                <a:t>Título de la presentación</a:t>
+              </a:r>
+              <a:endParaRPr sz="2000" b="1" i="0" u="none" strike="noStrike" cap="none">
+                <a:solidFill>
+                  <a:schemeClr val="lt1"/>
+                </a:solidFill>
+                <a:latin typeface="Montserrat"/>
+                <a:ea typeface="Montserrat"/>
+                <a:cs typeface="Montserrat"/>
+                <a:sym typeface="Montserrat"/>
+              </a:endParaRPr>
+            </a:p>
+          </p:txBody>
+        </p:sp>
+        <p:sp>
+          <p:nvSpPr>
+            <p:cNvPr id="172" name="Google Shape;172;p2"/>
+            <p:cNvSpPr/>
+            <p:nvPr/>
+          </p:nvSpPr>
+          <p:spPr>
+            <a:xfrm rot="-5400000">
+              <a:off x="53400" y="1673378"/>
+              <a:ext cx="269100" cy="375900"/>
+            </a:xfrm>
+            <a:prstGeom prst="rect">
+              <a:avLst/>
+            </a:prstGeom>
+            <a:gradFill>
+              <a:gsLst>
+                <a:gs pos="0">
+                  <a:srgbClr val="028CF5"/>
+                </a:gs>
+                <a:gs pos="100000">
+                  <a:srgbClr val="09CBE3"/>
+                </a:gs>
+              </a:gsLst>
+              <a:lin ang="18900044" scaled="0"/>
+            </a:gradFill>
+            <a:ln>
+              <a:noFill/>
+            </a:ln>
+          </p:spPr>
+          <p:txBody>
+            <a:bodyPr spcFirstLastPara="1" wrap="square" lIns="91425" tIns="91425" rIns="91425" bIns="91425" anchor="ctr" anchorCtr="0">
+              <a:noAutofit/>
+            </a:bodyPr>
+            <a:lstStyle/>
+            <a:p>
+              <a:pPr marL="0" marR="0" lvl="0" indent="0" algn="l" rtl="0">
+                <a:lnSpc>
+                  <a:spcPct val="100000"/>
+                </a:lnSpc>
+                <a:spcBef>
+                  <a:spcPts val="0"/>
+                </a:spcBef>
+                <a:spcAft>
+                  <a:spcPts val="0"/>
+                </a:spcAft>
+                <a:buClr>
+                  <a:srgbClr val="000000"/>
+                </a:buClr>
+                <a:buSzPts val="1400"/>
+                <a:buFont typeface="Arial"/>
+                <a:buNone/>
+              </a:pPr>
+              <a:endParaRPr sz="1400" b="0" i="0" u="none" strike="noStrike" cap="none">
+                <a:solidFill>
+                  <a:srgbClr val="000000"/>
+                </a:solidFill>
+                <a:latin typeface="Arial"/>
+                <a:ea typeface="Arial"/>
+                <a:cs typeface="Arial"/>
+                <a:sym typeface="Arial"/>
+              </a:endParaRPr>
+            </a:p>
+          </p:txBody>
+        </p:sp>
+      </p:grpSp>
+      <p:sp>
+        <p:nvSpPr>
+          <p:cNvPr id="173" name="Google Shape;173;p2"/>
+          <p:cNvSpPr txBox="1"/>
+          <p:nvPr/>
+        </p:nvSpPr>
+        <p:spPr>
+          <a:xfrm>
+            <a:off x="537975" y="1810025"/>
+            <a:ext cx="3927300" cy="2858770"/>
+          </a:xfrm>
+          <a:prstGeom prst="rect">
+            <a:avLst/>
+          </a:prstGeom>
+          <a:noFill/>
+          <a:ln>
+            <a:noFill/>
+          </a:ln>
+        </p:spPr>
+        <p:txBody>
+          <a:bodyPr spcFirstLastPara="1" wrap="square" lIns="91425" tIns="91425" rIns="91425" bIns="91425" anchor="t" anchorCtr="0">
+            <a:spAutoFit/>
+          </a:bodyPr>
+          <a:lstStyle/>
+          <a:p>
+            <a:pPr marL="0" marR="0" lvl="0" indent="0" algn="l" rtl="0">
+              <a:lnSpc>
+                <a:spcPct val="150000"/>
+              </a:lnSpc>
+              <a:spcBef>
+                <a:spcPts val="0"/>
+              </a:spcBef>
+              <a:spcAft>
+                <a:spcPts val="0"/>
+              </a:spcAft>
+              <a:buClr>
+                <a:srgbClr val="000000"/>
+              </a:buClr>
+              <a:buSzPts val="1400"/>
+              <a:buFont typeface="Arial"/>
+              <a:buNone/>
+            </a:pPr>
+            <a:r>
+              <a:rPr lang="es-ES" sz="1400" b="1" i="0" u="none" strike="noStrike" cap="none">
+                <a:solidFill>
+                  <a:srgbClr val="026FC0"/>
+                </a:solidFill>
+                <a:latin typeface="Montserrat"/>
+                <a:ea typeface="Montserrat"/>
+                <a:cs typeface="Montserrat"/>
+                <a:sym typeface="Montserrat"/>
+              </a:rPr>
+              <a:t>1.   </a:t>
+            </a:r>
+            <a:r>
+              <a:rPr lang="es-ES" sz="1400" b="0" i="0" u="none" strike="noStrike" cap="none">
+                <a:solidFill>
+                  <a:srgbClr val="1B1B1B"/>
+                </a:solidFill>
+                <a:latin typeface="Montserrat Medium"/>
+                <a:ea typeface="Montserrat Medium"/>
+                <a:cs typeface="Montserrat Medium"/>
+                <a:sym typeface="Montserrat Medium"/>
+              </a:rPr>
+              <a:t>Requisitos funcionales</a:t>
+            </a:r>
+            <a:endParaRPr sz="1400" b="0" i="0" u="none" strike="noStrike" cap="none">
+              <a:solidFill>
+                <a:srgbClr val="1B1B1B"/>
+              </a:solidFill>
+              <a:latin typeface="Montserrat Medium"/>
+              <a:ea typeface="Montserrat Medium"/>
+              <a:cs typeface="Montserrat Medium"/>
+              <a:sym typeface="Montserrat Medium"/>
+            </a:endParaRPr>
+          </a:p>
+          <a:p>
+            <a:pPr marL="0" marR="0" lvl="0" indent="0" algn="l" rtl="0">
+              <a:lnSpc>
+                <a:spcPct val="150000"/>
+              </a:lnSpc>
+              <a:spcBef>
+                <a:spcPts val="0"/>
+              </a:spcBef>
+              <a:spcAft>
+                <a:spcPts val="0"/>
+              </a:spcAft>
+              <a:buClr>
+                <a:srgbClr val="000000"/>
+              </a:buClr>
+              <a:buSzPts val="1400"/>
+              <a:buFont typeface="Arial"/>
+              <a:buNone/>
+            </a:pPr>
+            <a:r>
+              <a:rPr lang="es-ES" sz="1400" b="1" i="0" u="none" strike="noStrike" cap="none">
+                <a:solidFill>
+                  <a:srgbClr val="026FC0"/>
+                </a:solidFill>
+                <a:latin typeface="Montserrat"/>
+                <a:ea typeface="Montserrat"/>
+                <a:cs typeface="Montserrat"/>
+                <a:sym typeface="Montserrat"/>
+              </a:rPr>
+              <a:t>2.</a:t>
+            </a:r>
+            <a:r>
+              <a:rPr lang="es-ES" sz="1400" b="0" i="0" u="none" strike="noStrike" cap="none">
+                <a:solidFill>
+                  <a:srgbClr val="1B1B1B"/>
+                </a:solidFill>
+                <a:latin typeface="Montserrat Medium"/>
+                <a:ea typeface="Montserrat Medium"/>
+                <a:cs typeface="Montserrat Medium"/>
+                <a:sym typeface="Montserrat Medium"/>
+              </a:rPr>
+              <a:t> </a:t>
+            </a:r>
+            <a:r>
+              <a:rPr lang="es-ES" sz="1600" b="0" i="0" u="none" strike="noStrike" cap="none">
+                <a:solidFill>
+                  <a:srgbClr val="1B1B1B"/>
+                </a:solidFill>
+                <a:latin typeface="Montserrat Medium"/>
+                <a:ea typeface="Montserrat Medium"/>
+                <a:cs typeface="Montserrat Medium"/>
+                <a:sym typeface="Montserrat Medium"/>
+              </a:rPr>
+              <a:t>  </a:t>
+            </a:r>
+            <a:r>
+              <a:rPr lang="es-ES" sz="1400" b="0" i="0" u="none" strike="noStrike" cap="none">
+                <a:solidFill>
+                  <a:srgbClr val="1B1B1B"/>
+                </a:solidFill>
+                <a:latin typeface="Montserrat Medium"/>
+                <a:ea typeface="Montserrat Medium"/>
+                <a:cs typeface="Montserrat Medium"/>
+                <a:sym typeface="Montserrat Medium"/>
+              </a:rPr>
+              <a:t>Tecnologías utilizadas</a:t>
+            </a:r>
+            <a:endParaRPr sz="1400" b="0" i="0" u="none" strike="noStrike" cap="none">
+              <a:solidFill>
+                <a:srgbClr val="1B1B1B"/>
+              </a:solidFill>
+              <a:latin typeface="Montserrat Medium"/>
+              <a:ea typeface="Montserrat Medium"/>
+              <a:cs typeface="Montserrat Medium"/>
+              <a:sym typeface="Montserrat Medium"/>
+            </a:endParaRPr>
+          </a:p>
+          <a:p>
+            <a:pPr marL="0" marR="0" lvl="0" indent="0" algn="l" rtl="0">
+              <a:lnSpc>
+                <a:spcPct val="150000"/>
+              </a:lnSpc>
+              <a:spcBef>
+                <a:spcPts val="0"/>
+              </a:spcBef>
+              <a:spcAft>
+                <a:spcPts val="0"/>
+              </a:spcAft>
+              <a:buClr>
+                <a:srgbClr val="000000"/>
+              </a:buClr>
+              <a:buSzPts val="1400"/>
+              <a:buFont typeface="Arial"/>
+              <a:buNone/>
+            </a:pPr>
+            <a:r>
+              <a:rPr lang="es-ES" sz="1400" b="1" i="0" u="none" strike="noStrike" cap="none">
+                <a:solidFill>
+                  <a:srgbClr val="026FC0"/>
+                </a:solidFill>
+                <a:latin typeface="Montserrat"/>
+                <a:ea typeface="Montserrat"/>
+                <a:cs typeface="Montserrat"/>
+                <a:sym typeface="Montserrat"/>
+              </a:rPr>
+              <a:t>3.</a:t>
+            </a:r>
+            <a:r>
+              <a:rPr lang="es-ES" sz="1600" b="1" i="0" u="none" strike="noStrike" cap="none">
+                <a:solidFill>
+                  <a:srgbClr val="026FC0"/>
+                </a:solidFill>
+                <a:latin typeface="Montserrat"/>
+                <a:ea typeface="Montserrat"/>
+                <a:cs typeface="Montserrat"/>
+                <a:sym typeface="Montserrat"/>
+              </a:rPr>
+              <a:t>   </a:t>
+            </a:r>
+            <a:r>
+              <a:rPr lang="es-ES" sz="1400" b="0" i="0" u="none" strike="noStrike" cap="none">
+                <a:solidFill>
+                  <a:srgbClr val="1B1B1B"/>
+                </a:solidFill>
+                <a:latin typeface="Montserrat Medium"/>
+                <a:ea typeface="Montserrat Medium"/>
+                <a:cs typeface="Montserrat Medium"/>
+                <a:sym typeface="Montserrat Medium"/>
+              </a:rPr>
+              <a:t>Arquitectura del proyecto</a:t>
+            </a:r>
+            <a:endParaRPr sz="1400" b="0" i="0" u="none" strike="noStrike" cap="none">
+              <a:solidFill>
+                <a:srgbClr val="1B1B1B"/>
+              </a:solidFill>
+              <a:latin typeface="Montserrat Medium"/>
+              <a:ea typeface="Montserrat Medium"/>
+              <a:cs typeface="Montserrat Medium"/>
+              <a:sym typeface="Montserrat Medium"/>
+            </a:endParaRPr>
+          </a:p>
+          <a:p>
+            <a:pPr marL="0" marR="0" lvl="0" indent="0" algn="l" rtl="0">
+              <a:lnSpc>
+                <a:spcPct val="150000"/>
+              </a:lnSpc>
+              <a:spcBef>
+                <a:spcPts val="0"/>
+              </a:spcBef>
+              <a:spcAft>
+                <a:spcPts val="0"/>
+              </a:spcAft>
+              <a:buClr>
+                <a:srgbClr val="000000"/>
+              </a:buClr>
+              <a:buSzPts val="1400"/>
+              <a:buFont typeface="Arial"/>
+              <a:buNone/>
+            </a:pPr>
+            <a:r>
+              <a:rPr lang="es-ES" sz="1400" b="1" i="0" u="none" strike="noStrike" cap="none">
+                <a:solidFill>
+                  <a:srgbClr val="026FC0"/>
+                </a:solidFill>
+                <a:latin typeface="Montserrat"/>
+                <a:ea typeface="Montserrat"/>
+                <a:cs typeface="Montserrat"/>
+                <a:sym typeface="Montserrat"/>
+              </a:rPr>
+              <a:t>4.   </a:t>
+            </a:r>
+            <a:r>
+              <a:rPr lang="es-ES" sz="1400" b="0" i="0" u="none" strike="noStrike" cap="none">
+                <a:solidFill>
+                  <a:srgbClr val="1B1B1B"/>
+                </a:solidFill>
+                <a:latin typeface="Montserrat Medium"/>
+                <a:ea typeface="Montserrat Medium"/>
+                <a:cs typeface="Montserrat Medium"/>
+                <a:sym typeface="Montserrat Medium"/>
+              </a:rPr>
+              <a:t>Estructura del proyecto</a:t>
+            </a:r>
+            <a:endParaRPr sz="1400" b="0" i="0" u="none" strike="noStrike" cap="none">
+              <a:solidFill>
+                <a:srgbClr val="1B1B1B"/>
+              </a:solidFill>
+              <a:latin typeface="Montserrat Medium"/>
+              <a:ea typeface="Montserrat Medium"/>
+              <a:cs typeface="Montserrat Medium"/>
+              <a:sym typeface="Montserrat Medium"/>
+            </a:endParaRPr>
+          </a:p>
+          <a:p>
+            <a:pPr marL="0" marR="0" lvl="0" indent="0" algn="l" rtl="0">
+              <a:lnSpc>
+                <a:spcPct val="150000"/>
+              </a:lnSpc>
+              <a:spcBef>
+                <a:spcPts val="0"/>
+              </a:spcBef>
+              <a:spcAft>
+                <a:spcPts val="0"/>
+              </a:spcAft>
+              <a:buClr>
+                <a:srgbClr val="000000"/>
+              </a:buClr>
+              <a:buSzPts val="1400"/>
+              <a:buFont typeface="Arial"/>
+              <a:buNone/>
+            </a:pPr>
+            <a:r>
+              <a:rPr lang="es-ES" sz="1400" b="1" i="0" u="none" strike="noStrike" cap="none">
+                <a:solidFill>
+                  <a:srgbClr val="026FC0"/>
+                </a:solidFill>
+                <a:latin typeface="Montserrat"/>
+                <a:ea typeface="Montserrat"/>
+                <a:cs typeface="Montserrat"/>
+                <a:sym typeface="Montserrat"/>
+              </a:rPr>
+              <a:t>5.   </a:t>
+            </a:r>
+            <a:r>
+              <a:rPr lang="es-ES" sz="1400" b="0" i="0" u="none" strike="noStrike" cap="none">
+                <a:solidFill>
+                  <a:srgbClr val="1B1B1B"/>
+                </a:solidFill>
+                <a:latin typeface="Montserrat Medium"/>
+                <a:ea typeface="Montserrat Medium"/>
+                <a:cs typeface="Montserrat Medium"/>
+                <a:sym typeface="Montserrat Medium"/>
+              </a:rPr>
+              <a:t>Demostración</a:t>
+            </a:r>
+            <a:endParaRPr sz="1400" b="0" i="0" u="none" strike="noStrike" cap="none">
+              <a:solidFill>
+                <a:srgbClr val="1B1B1B"/>
+              </a:solidFill>
+              <a:latin typeface="Montserrat Medium"/>
+              <a:ea typeface="Montserrat Medium"/>
+              <a:cs typeface="Montserrat Medium"/>
+              <a:sym typeface="Montserrat Medium"/>
+            </a:endParaRPr>
+          </a:p>
+          <a:p>
+            <a:pPr marL="0" marR="0" lvl="0" indent="0" algn="l" rtl="0">
+              <a:lnSpc>
+                <a:spcPct val="150000"/>
+              </a:lnSpc>
+              <a:spcBef>
+                <a:spcPts val="0"/>
+              </a:spcBef>
+              <a:spcAft>
+                <a:spcPts val="0"/>
+              </a:spcAft>
+              <a:buClr>
+                <a:srgbClr val="000000"/>
+              </a:buClr>
+              <a:buSzPts val="1400"/>
+              <a:buFont typeface="Arial"/>
+              <a:buNone/>
+            </a:pPr>
+            <a:r>
+              <a:rPr lang="es-ES" sz="1400" b="1" i="0" u="none" strike="noStrike" cap="none">
+                <a:solidFill>
+                  <a:srgbClr val="026FC0"/>
+                </a:solidFill>
+                <a:latin typeface="Montserrat"/>
+                <a:ea typeface="Montserrat"/>
+                <a:cs typeface="Montserrat"/>
+                <a:sym typeface="Montserrat"/>
+              </a:rPr>
+              <a:t>6.   </a:t>
+            </a:r>
+            <a:r>
+              <a:rPr lang="es-ES" sz="1400" b="0" i="0" u="none" strike="noStrike" cap="none">
+                <a:solidFill>
+                  <a:srgbClr val="1B1B1B"/>
+                </a:solidFill>
+                <a:latin typeface="Montserrat Medium"/>
+                <a:ea typeface="Montserrat Medium"/>
+                <a:cs typeface="Montserrat Medium"/>
+                <a:sym typeface="Montserrat Medium"/>
+              </a:rPr>
+              <a:t>Preguntas</a:t>
+            </a:r>
+            <a:endParaRPr sz="1400" b="0" i="0" u="none" strike="noStrike" cap="none">
+              <a:solidFill>
+                <a:srgbClr val="1B1B1B"/>
+              </a:solidFill>
+              <a:latin typeface="Montserrat Medium"/>
+              <a:ea typeface="Montserrat Medium"/>
+              <a:cs typeface="Montserrat Medium"/>
+              <a:sym typeface="Montserrat Medium"/>
+            </a:endParaRPr>
+          </a:p>
+          <a:p>
+            <a:pPr marL="0" marR="0" lvl="0" indent="0" algn="l" rtl="0">
+              <a:lnSpc>
+                <a:spcPct val="150000"/>
+              </a:lnSpc>
+              <a:spcBef>
+                <a:spcPts val="0"/>
+              </a:spcBef>
+              <a:spcAft>
+                <a:spcPts val="0"/>
+              </a:spcAft>
+              <a:buClr>
+                <a:srgbClr val="000000"/>
+              </a:buClr>
+              <a:buSzPts val="1400"/>
+              <a:buFont typeface="Arial"/>
+              <a:buNone/>
+            </a:pPr>
+            <a:r>
+              <a:rPr lang="es-ES" sz="1400" b="1" i="0" u="none" strike="noStrike" cap="none">
+                <a:solidFill>
+                  <a:srgbClr val="026FC0"/>
+                </a:solidFill>
+                <a:latin typeface="Montserrat"/>
+                <a:ea typeface="Montserrat"/>
+                <a:cs typeface="Montserrat"/>
+                <a:sym typeface="Montserrat"/>
+              </a:rPr>
+              <a:t>7.</a:t>
+            </a:r>
+            <a:r>
+              <a:rPr lang="es-ES" sz="1400" b="0" i="0" u="none" strike="noStrike" cap="none">
+                <a:solidFill>
+                  <a:srgbClr val="1B1B1B"/>
+                </a:solidFill>
+                <a:latin typeface="Montserrat Medium"/>
+                <a:ea typeface="Montserrat Medium"/>
+                <a:cs typeface="Montserrat Medium"/>
+                <a:sym typeface="Montserrat Medium"/>
+              </a:rPr>
+              <a:t>   Anexo I - Pantallazos de la aplicación</a:t>
+            </a:r>
+            <a:endParaRPr sz="1400" b="0" i="0" u="none" strike="noStrike" cap="none">
+              <a:solidFill>
+                <a:srgbClr val="1B1B1B"/>
+              </a:solidFill>
+              <a:latin typeface="Montserrat Medium"/>
+              <a:ea typeface="Montserrat Medium"/>
+              <a:cs typeface="Montserrat Medium"/>
+              <a:sym typeface="Montserrat Medium"/>
+            </a:endParaRPr>
+          </a:p>
+          <a:p>
+            <a:pPr marL="0" marR="0" lvl="0" indent="0" algn="l" rtl="0">
+              <a:lnSpc>
+                <a:spcPct val="150000"/>
+              </a:lnSpc>
+              <a:spcBef>
+                <a:spcPts val="0"/>
+              </a:spcBef>
+              <a:spcAft>
+                <a:spcPts val="0"/>
+              </a:spcAft>
+              <a:buClr>
+                <a:srgbClr val="000000"/>
+              </a:buClr>
+              <a:buSzPts val="1400"/>
+              <a:buFont typeface="Arial"/>
+              <a:buNone/>
+            </a:pPr>
+            <a:endParaRPr sz="1400" b="0" i="0" u="none" strike="noStrike" cap="none">
+              <a:solidFill>
+                <a:srgbClr val="1B1B1B"/>
+              </a:solidFill>
+              <a:latin typeface="Montserrat Medium"/>
+              <a:ea typeface="Montserrat Medium"/>
+              <a:cs typeface="Montserrat Medium"/>
+              <a:sym typeface="Montserrat Medium"/>
+            </a:endParaRPr>
+          </a:p>
+        </p:txBody>
+      </p:sp>
+      <p:sp>
+        <p:nvSpPr>
+          <p:cNvPr id="174" name="Google Shape;174;p2"/>
+          <p:cNvSpPr txBox="1"/>
+          <p:nvPr/>
+        </p:nvSpPr>
+        <p:spPr>
+          <a:xfrm>
+            <a:off x="537975" y="1336900"/>
+            <a:ext cx="2316900" cy="392400"/>
+          </a:xfrm>
+          <a:prstGeom prst="rect">
+            <a:avLst/>
+          </a:prstGeom>
+          <a:noFill/>
+          <a:ln>
+            <a:noFill/>
+          </a:ln>
+        </p:spPr>
+        <p:txBody>
+          <a:bodyPr spcFirstLastPara="1" wrap="square" lIns="91425" tIns="91425" rIns="91425" bIns="91425" anchor="ctr" anchorCtr="0">
+            <a:noAutofit/>
+          </a:bodyPr>
+          <a:lstStyle/>
+          <a:p>
+            <a:pPr marL="0" marR="0" lvl="0" indent="0" algn="l" rtl="0">
+              <a:lnSpc>
+                <a:spcPct val="115000"/>
+              </a:lnSpc>
+              <a:spcBef>
+                <a:spcPts val="0"/>
+              </a:spcBef>
+              <a:spcAft>
+                <a:spcPts val="0"/>
+              </a:spcAft>
+              <a:buClr>
+                <a:srgbClr val="000000"/>
+              </a:buClr>
+              <a:buSzPts val="1800"/>
+              <a:buFont typeface="Arial"/>
+              <a:buNone/>
+            </a:pPr>
+            <a:r>
+              <a:rPr lang="es-ES" sz="1600" b="1" i="0" u="none" strike="noStrike" cap="none">
+                <a:solidFill>
+                  <a:srgbClr val="1B1B1B"/>
+                </a:solidFill>
+                <a:latin typeface="Montserrat"/>
+                <a:ea typeface="Montserrat"/>
+                <a:cs typeface="Montserrat"/>
+                <a:sym typeface="Montserrat"/>
+              </a:rPr>
+              <a:t>Índice</a:t>
+            </a:r>
+            <a:endParaRPr sz="1600" b="1" i="0" u="none" strike="noStrike" cap="none">
+              <a:solidFill>
+                <a:srgbClr val="026FC1"/>
+              </a:solidFill>
+              <a:latin typeface="Montserrat"/>
+              <a:ea typeface="Montserrat"/>
+              <a:cs typeface="Montserrat"/>
+              <a:sym typeface="Montserrat"/>
+            </a:endParaRPr>
+          </a:p>
+        </p:txBody>
+      </p:sp>
+    </p:spTree>
+  </p:cSld>
+  <p:clrMapOvr>
+    <a:masterClrMapping/>
+  </p:clrMapOvr>
+</p:sld>
+</file>
+
+<file path=ppt/slides/slide20.xml><?xml version="1.0" encoding="utf-8"?>
 <p:sld xmlns:a="http://schemas.openxmlformats.org/drawingml/2006/main" xmlns:r="http://schemas.openxmlformats.org/officeDocument/2006/relationships" xmlns:p="http://schemas.openxmlformats.org/presentationml/2006/main">
   <p:cSld>
     <p:bg>
@@ -17681,696 +18482,6 @@
           </p:txBody>
         </p:sp>
       </p:grpSp>
-    </p:spTree>
-  </p:cSld>
-  <p:clrMapOvr>
-    <a:masterClrMapping/>
-  </p:clrMapOvr>
-</p:sld>
-</file>
-
-<file path=ppt/slides/slide2.xml><?xml version="1.0" encoding="utf-8"?>
-<p:sld xmlns:a="http://schemas.openxmlformats.org/drawingml/2006/main" xmlns:r="http://schemas.openxmlformats.org/officeDocument/2006/relationships" xmlns:p="http://schemas.openxmlformats.org/presentationml/2006/main">
-  <p:cSld>
-    <p:spTree>
-      <p:nvGrpSpPr>
-        <p:cNvPr id="1" name="Shape 169"/>
-        <p:cNvGrpSpPr/>
-        <p:nvPr/>
-      </p:nvGrpSpPr>
-      <p:grpSpPr>
-        <a:xfrm>
-          <a:off x="0" y="0"/>
-          <a:ext cx="0" cy="0"/>
-          <a:chOff x="0" y="0"/>
-          <a:chExt cx="0" cy="0"/>
-        </a:xfrm>
-      </p:grpSpPr>
-      <p:grpSp>
-        <p:nvGrpSpPr>
-          <p:cNvPr id="170" name="Google Shape;170;p2"/>
-          <p:cNvGrpSpPr/>
-          <p:nvPr/>
-        </p:nvGrpSpPr>
-        <p:grpSpPr>
-          <a:xfrm>
-            <a:off x="0" y="389900"/>
-            <a:ext cx="7170025" cy="754293"/>
-            <a:chOff x="0" y="1394669"/>
-            <a:chExt cx="7170025" cy="933300"/>
-          </a:xfrm>
-        </p:grpSpPr>
-        <p:sp>
-          <p:nvSpPr>
-            <p:cNvPr id="171" name="Google Shape;171;p2"/>
-            <p:cNvSpPr txBox="1"/>
-            <p:nvPr/>
-          </p:nvSpPr>
-          <p:spPr>
-            <a:xfrm>
-              <a:off x="459325" y="1394669"/>
-              <a:ext cx="6710700" cy="933300"/>
-            </a:xfrm>
-            <a:prstGeom prst="rect">
-              <a:avLst/>
-            </a:prstGeom>
-            <a:noFill/>
-            <a:ln>
-              <a:noFill/>
-            </a:ln>
-          </p:spPr>
-          <p:txBody>
-            <a:bodyPr spcFirstLastPara="1" wrap="square" lIns="91425" tIns="91425" rIns="91425" bIns="91425" anchor="ctr" anchorCtr="0">
-              <a:noAutofit/>
-            </a:bodyPr>
-            <a:lstStyle/>
-            <a:p>
-              <a:pPr marL="0" marR="0" lvl="0" indent="0" algn="l" rtl="0">
-                <a:lnSpc>
-                  <a:spcPct val="115000"/>
-                </a:lnSpc>
-                <a:spcBef>
-                  <a:spcPts val="0"/>
-                </a:spcBef>
-                <a:spcAft>
-                  <a:spcPts val="0"/>
-                </a:spcAft>
-                <a:buClr>
-                  <a:schemeClr val="dk1"/>
-                </a:buClr>
-                <a:buSzPts val="1800"/>
-                <a:buFont typeface="Arial"/>
-                <a:buNone/>
-              </a:pPr>
-              <a:r>
-                <a:rPr lang="es-ES" sz="2000" b="1" i="0" u="none" strike="noStrike" cap="none">
-                  <a:solidFill>
-                    <a:schemeClr val="lt1"/>
-                  </a:solidFill>
-                  <a:latin typeface="Montserrat"/>
-                  <a:ea typeface="Montserrat"/>
-                  <a:cs typeface="Montserrat"/>
-                  <a:sym typeface="Montserrat"/>
-                </a:rPr>
-                <a:t>Título de la presentación</a:t>
-              </a:r>
-              <a:endParaRPr sz="2000" b="1" i="0" u="none" strike="noStrike" cap="none">
-                <a:solidFill>
-                  <a:schemeClr val="lt1"/>
-                </a:solidFill>
-                <a:latin typeface="Montserrat"/>
-                <a:ea typeface="Montserrat"/>
-                <a:cs typeface="Montserrat"/>
-                <a:sym typeface="Montserrat"/>
-              </a:endParaRPr>
-            </a:p>
-          </p:txBody>
-        </p:sp>
-        <p:sp>
-          <p:nvSpPr>
-            <p:cNvPr id="172" name="Google Shape;172;p2"/>
-            <p:cNvSpPr/>
-            <p:nvPr/>
-          </p:nvSpPr>
-          <p:spPr>
-            <a:xfrm rot="-5400000">
-              <a:off x="53400" y="1673378"/>
-              <a:ext cx="269100" cy="375900"/>
-            </a:xfrm>
-            <a:prstGeom prst="rect">
-              <a:avLst/>
-            </a:prstGeom>
-            <a:gradFill>
-              <a:gsLst>
-                <a:gs pos="0">
-                  <a:srgbClr val="028CF5"/>
-                </a:gs>
-                <a:gs pos="100000">
-                  <a:srgbClr val="09CBE3"/>
-                </a:gs>
-              </a:gsLst>
-              <a:lin ang="18900044" scaled="0"/>
-            </a:gradFill>
-            <a:ln>
-              <a:noFill/>
-            </a:ln>
-          </p:spPr>
-          <p:txBody>
-            <a:bodyPr spcFirstLastPara="1" wrap="square" lIns="91425" tIns="91425" rIns="91425" bIns="91425" anchor="ctr" anchorCtr="0">
-              <a:noAutofit/>
-            </a:bodyPr>
-            <a:lstStyle/>
-            <a:p>
-              <a:pPr marL="0" marR="0" lvl="0" indent="0" algn="l" rtl="0">
-                <a:lnSpc>
-                  <a:spcPct val="100000"/>
-                </a:lnSpc>
-                <a:spcBef>
-                  <a:spcPts val="0"/>
-                </a:spcBef>
-                <a:spcAft>
-                  <a:spcPts val="0"/>
-                </a:spcAft>
-                <a:buClr>
-                  <a:srgbClr val="000000"/>
-                </a:buClr>
-                <a:buSzPts val="1400"/>
-                <a:buFont typeface="Arial"/>
-                <a:buNone/>
-              </a:pPr>
-              <a:endParaRPr sz="1400" b="0" i="0" u="none" strike="noStrike" cap="none">
-                <a:solidFill>
-                  <a:srgbClr val="000000"/>
-                </a:solidFill>
-                <a:latin typeface="Arial"/>
-                <a:ea typeface="Arial"/>
-                <a:cs typeface="Arial"/>
-                <a:sym typeface="Arial"/>
-              </a:endParaRPr>
-            </a:p>
-          </p:txBody>
-        </p:sp>
-      </p:grpSp>
-      <p:sp>
-        <p:nvSpPr>
-          <p:cNvPr id="173" name="Google Shape;173;p2"/>
-          <p:cNvSpPr txBox="1"/>
-          <p:nvPr/>
-        </p:nvSpPr>
-        <p:spPr>
-          <a:xfrm>
-            <a:off x="537975" y="1810025"/>
-            <a:ext cx="3927300" cy="2858770"/>
-          </a:xfrm>
-          <a:prstGeom prst="rect">
-            <a:avLst/>
-          </a:prstGeom>
-          <a:noFill/>
-          <a:ln>
-            <a:noFill/>
-          </a:ln>
-        </p:spPr>
-        <p:txBody>
-          <a:bodyPr spcFirstLastPara="1" wrap="square" lIns="91425" tIns="91425" rIns="91425" bIns="91425" anchor="t" anchorCtr="0">
-            <a:spAutoFit/>
-          </a:bodyPr>
-          <a:lstStyle/>
-          <a:p>
-            <a:pPr marL="0" marR="0" lvl="0" indent="0" algn="l" rtl="0">
-              <a:lnSpc>
-                <a:spcPct val="150000"/>
-              </a:lnSpc>
-              <a:spcBef>
-                <a:spcPts val="0"/>
-              </a:spcBef>
-              <a:spcAft>
-                <a:spcPts val="0"/>
-              </a:spcAft>
-              <a:buClr>
-                <a:srgbClr val="000000"/>
-              </a:buClr>
-              <a:buSzPts val="1400"/>
-              <a:buFont typeface="Arial"/>
-              <a:buNone/>
-            </a:pPr>
-            <a:r>
-              <a:rPr lang="es-ES" sz="1400" b="1" i="0" u="none" strike="noStrike" cap="none">
-                <a:solidFill>
-                  <a:srgbClr val="026FC0"/>
-                </a:solidFill>
-                <a:latin typeface="Montserrat"/>
-                <a:ea typeface="Montserrat"/>
-                <a:cs typeface="Montserrat"/>
-                <a:sym typeface="Montserrat"/>
-              </a:rPr>
-              <a:t>1.   </a:t>
-            </a:r>
-            <a:r>
-              <a:rPr lang="es-ES" sz="1400" b="0" i="0" u="none" strike="noStrike" cap="none">
-                <a:solidFill>
-                  <a:srgbClr val="1B1B1B"/>
-                </a:solidFill>
-                <a:latin typeface="Montserrat Medium"/>
-                <a:ea typeface="Montserrat Medium"/>
-                <a:cs typeface="Montserrat Medium"/>
-                <a:sym typeface="Montserrat Medium"/>
-              </a:rPr>
-              <a:t>Requisitos funcionales</a:t>
-            </a:r>
-            <a:endParaRPr sz="1400" b="0" i="0" u="none" strike="noStrike" cap="none">
-              <a:solidFill>
-                <a:srgbClr val="1B1B1B"/>
-              </a:solidFill>
-              <a:latin typeface="Montserrat Medium"/>
-              <a:ea typeface="Montserrat Medium"/>
-              <a:cs typeface="Montserrat Medium"/>
-              <a:sym typeface="Montserrat Medium"/>
-            </a:endParaRPr>
-          </a:p>
-          <a:p>
-            <a:pPr marL="0" marR="0" lvl="0" indent="0" algn="l" rtl="0">
-              <a:lnSpc>
-                <a:spcPct val="150000"/>
-              </a:lnSpc>
-              <a:spcBef>
-                <a:spcPts val="0"/>
-              </a:spcBef>
-              <a:spcAft>
-                <a:spcPts val="0"/>
-              </a:spcAft>
-              <a:buClr>
-                <a:srgbClr val="000000"/>
-              </a:buClr>
-              <a:buSzPts val="1400"/>
-              <a:buFont typeface="Arial"/>
-              <a:buNone/>
-            </a:pPr>
-            <a:r>
-              <a:rPr lang="es-ES" sz="1400" b="1" i="0" u="none" strike="noStrike" cap="none">
-                <a:solidFill>
-                  <a:srgbClr val="026FC0"/>
-                </a:solidFill>
-                <a:latin typeface="Montserrat"/>
-                <a:ea typeface="Montserrat"/>
-                <a:cs typeface="Montserrat"/>
-                <a:sym typeface="Montserrat"/>
-              </a:rPr>
-              <a:t>2.</a:t>
-            </a:r>
-            <a:r>
-              <a:rPr lang="es-ES" sz="1400" b="0" i="0" u="none" strike="noStrike" cap="none">
-                <a:solidFill>
-                  <a:srgbClr val="1B1B1B"/>
-                </a:solidFill>
-                <a:latin typeface="Montserrat Medium"/>
-                <a:ea typeface="Montserrat Medium"/>
-                <a:cs typeface="Montserrat Medium"/>
-                <a:sym typeface="Montserrat Medium"/>
-              </a:rPr>
-              <a:t> </a:t>
-            </a:r>
-            <a:r>
-              <a:rPr lang="es-ES" sz="1600" b="0" i="0" u="none" strike="noStrike" cap="none">
-                <a:solidFill>
-                  <a:srgbClr val="1B1B1B"/>
-                </a:solidFill>
-                <a:latin typeface="Montserrat Medium"/>
-                <a:ea typeface="Montserrat Medium"/>
-                <a:cs typeface="Montserrat Medium"/>
-                <a:sym typeface="Montserrat Medium"/>
-              </a:rPr>
-              <a:t>  </a:t>
-            </a:r>
-            <a:r>
-              <a:rPr lang="es-ES" sz="1400" b="0" i="0" u="none" strike="noStrike" cap="none">
-                <a:solidFill>
-                  <a:srgbClr val="1B1B1B"/>
-                </a:solidFill>
-                <a:latin typeface="Montserrat Medium"/>
-                <a:ea typeface="Montserrat Medium"/>
-                <a:cs typeface="Montserrat Medium"/>
-                <a:sym typeface="Montserrat Medium"/>
-              </a:rPr>
-              <a:t>Tecnologías utilizadas</a:t>
-            </a:r>
-            <a:endParaRPr sz="1400" b="0" i="0" u="none" strike="noStrike" cap="none">
-              <a:solidFill>
-                <a:srgbClr val="1B1B1B"/>
-              </a:solidFill>
-              <a:latin typeface="Montserrat Medium"/>
-              <a:ea typeface="Montserrat Medium"/>
-              <a:cs typeface="Montserrat Medium"/>
-              <a:sym typeface="Montserrat Medium"/>
-            </a:endParaRPr>
-          </a:p>
-          <a:p>
-            <a:pPr marL="0" marR="0" lvl="0" indent="0" algn="l" rtl="0">
-              <a:lnSpc>
-                <a:spcPct val="150000"/>
-              </a:lnSpc>
-              <a:spcBef>
-                <a:spcPts val="0"/>
-              </a:spcBef>
-              <a:spcAft>
-                <a:spcPts val="0"/>
-              </a:spcAft>
-              <a:buClr>
-                <a:srgbClr val="000000"/>
-              </a:buClr>
-              <a:buSzPts val="1400"/>
-              <a:buFont typeface="Arial"/>
-              <a:buNone/>
-            </a:pPr>
-            <a:r>
-              <a:rPr lang="es-ES" sz="1400" b="1" i="0" u="none" strike="noStrike" cap="none">
-                <a:solidFill>
-                  <a:srgbClr val="026FC0"/>
-                </a:solidFill>
-                <a:latin typeface="Montserrat"/>
-                <a:ea typeface="Montserrat"/>
-                <a:cs typeface="Montserrat"/>
-                <a:sym typeface="Montserrat"/>
-              </a:rPr>
-              <a:t>3.</a:t>
-            </a:r>
-            <a:r>
-              <a:rPr lang="es-ES" sz="1600" b="1" i="0" u="none" strike="noStrike" cap="none">
-                <a:solidFill>
-                  <a:srgbClr val="026FC0"/>
-                </a:solidFill>
-                <a:latin typeface="Montserrat"/>
-                <a:ea typeface="Montserrat"/>
-                <a:cs typeface="Montserrat"/>
-                <a:sym typeface="Montserrat"/>
-              </a:rPr>
-              <a:t>   </a:t>
-            </a:r>
-            <a:r>
-              <a:rPr lang="es-ES" sz="1400" b="0" i="0" u="none" strike="noStrike" cap="none">
-                <a:solidFill>
-                  <a:srgbClr val="1B1B1B"/>
-                </a:solidFill>
-                <a:latin typeface="Montserrat Medium"/>
-                <a:ea typeface="Montserrat Medium"/>
-                <a:cs typeface="Montserrat Medium"/>
-                <a:sym typeface="Montserrat Medium"/>
-              </a:rPr>
-              <a:t>Arquitectura del proyecto</a:t>
-            </a:r>
-            <a:endParaRPr sz="1400" b="0" i="0" u="none" strike="noStrike" cap="none">
-              <a:solidFill>
-                <a:srgbClr val="1B1B1B"/>
-              </a:solidFill>
-              <a:latin typeface="Montserrat Medium"/>
-              <a:ea typeface="Montserrat Medium"/>
-              <a:cs typeface="Montserrat Medium"/>
-              <a:sym typeface="Montserrat Medium"/>
-            </a:endParaRPr>
-          </a:p>
-          <a:p>
-            <a:pPr marL="0" marR="0" lvl="0" indent="0" algn="l" rtl="0">
-              <a:lnSpc>
-                <a:spcPct val="150000"/>
-              </a:lnSpc>
-              <a:spcBef>
-                <a:spcPts val="0"/>
-              </a:spcBef>
-              <a:spcAft>
-                <a:spcPts val="0"/>
-              </a:spcAft>
-              <a:buClr>
-                <a:srgbClr val="000000"/>
-              </a:buClr>
-              <a:buSzPts val="1400"/>
-              <a:buFont typeface="Arial"/>
-              <a:buNone/>
-            </a:pPr>
-            <a:r>
-              <a:rPr lang="es-ES" sz="1400" b="1" i="0" u="none" strike="noStrike" cap="none">
-                <a:solidFill>
-                  <a:srgbClr val="026FC0"/>
-                </a:solidFill>
-                <a:latin typeface="Montserrat"/>
-                <a:ea typeface="Montserrat"/>
-                <a:cs typeface="Montserrat"/>
-                <a:sym typeface="Montserrat"/>
-              </a:rPr>
-              <a:t>4.   </a:t>
-            </a:r>
-            <a:r>
-              <a:rPr lang="es-ES" sz="1400" b="0" i="0" u="none" strike="noStrike" cap="none">
-                <a:solidFill>
-                  <a:srgbClr val="1B1B1B"/>
-                </a:solidFill>
-                <a:latin typeface="Montserrat Medium"/>
-                <a:ea typeface="Montserrat Medium"/>
-                <a:cs typeface="Montserrat Medium"/>
-                <a:sym typeface="Montserrat Medium"/>
-              </a:rPr>
-              <a:t>Estructura del proyecto</a:t>
-            </a:r>
-            <a:endParaRPr sz="1400" b="0" i="0" u="none" strike="noStrike" cap="none">
-              <a:solidFill>
-                <a:srgbClr val="1B1B1B"/>
-              </a:solidFill>
-              <a:latin typeface="Montserrat Medium"/>
-              <a:ea typeface="Montserrat Medium"/>
-              <a:cs typeface="Montserrat Medium"/>
-              <a:sym typeface="Montserrat Medium"/>
-            </a:endParaRPr>
-          </a:p>
-          <a:p>
-            <a:pPr marL="0" marR="0" lvl="0" indent="0" algn="l" rtl="0">
-              <a:lnSpc>
-                <a:spcPct val="150000"/>
-              </a:lnSpc>
-              <a:spcBef>
-                <a:spcPts val="0"/>
-              </a:spcBef>
-              <a:spcAft>
-                <a:spcPts val="0"/>
-              </a:spcAft>
-              <a:buClr>
-                <a:srgbClr val="000000"/>
-              </a:buClr>
-              <a:buSzPts val="1400"/>
-              <a:buFont typeface="Arial"/>
-              <a:buNone/>
-            </a:pPr>
-            <a:r>
-              <a:rPr lang="es-ES" sz="1400" b="1" i="0" u="none" strike="noStrike" cap="none">
-                <a:solidFill>
-                  <a:srgbClr val="026FC0"/>
-                </a:solidFill>
-                <a:latin typeface="Montserrat"/>
-                <a:ea typeface="Montserrat"/>
-                <a:cs typeface="Montserrat"/>
-                <a:sym typeface="Montserrat"/>
-              </a:rPr>
-              <a:t>5.   </a:t>
-            </a:r>
-            <a:r>
-              <a:rPr lang="es-ES" sz="1400" b="0" i="0" u="none" strike="noStrike" cap="none">
-                <a:solidFill>
-                  <a:srgbClr val="1B1B1B"/>
-                </a:solidFill>
-                <a:latin typeface="Montserrat Medium"/>
-                <a:ea typeface="Montserrat Medium"/>
-                <a:cs typeface="Montserrat Medium"/>
-                <a:sym typeface="Montserrat Medium"/>
-              </a:rPr>
-              <a:t>Demostración</a:t>
-            </a:r>
-            <a:endParaRPr sz="1400" b="0" i="0" u="none" strike="noStrike" cap="none">
-              <a:solidFill>
-                <a:srgbClr val="1B1B1B"/>
-              </a:solidFill>
-              <a:latin typeface="Montserrat Medium"/>
-              <a:ea typeface="Montserrat Medium"/>
-              <a:cs typeface="Montserrat Medium"/>
-              <a:sym typeface="Montserrat Medium"/>
-            </a:endParaRPr>
-          </a:p>
-          <a:p>
-            <a:pPr marL="0" marR="0" lvl="0" indent="0" algn="l" rtl="0">
-              <a:lnSpc>
-                <a:spcPct val="150000"/>
-              </a:lnSpc>
-              <a:spcBef>
-                <a:spcPts val="0"/>
-              </a:spcBef>
-              <a:spcAft>
-                <a:spcPts val="0"/>
-              </a:spcAft>
-              <a:buClr>
-                <a:srgbClr val="000000"/>
-              </a:buClr>
-              <a:buSzPts val="1400"/>
-              <a:buFont typeface="Arial"/>
-              <a:buNone/>
-            </a:pPr>
-            <a:r>
-              <a:rPr lang="es-ES" sz="1400" b="1" i="0" u="none" strike="noStrike" cap="none">
-                <a:solidFill>
-                  <a:srgbClr val="026FC0"/>
-                </a:solidFill>
-                <a:latin typeface="Montserrat"/>
-                <a:ea typeface="Montserrat"/>
-                <a:cs typeface="Montserrat"/>
-                <a:sym typeface="Montserrat"/>
-              </a:rPr>
-              <a:t>6.   </a:t>
-            </a:r>
-            <a:r>
-              <a:rPr lang="es-ES" sz="1400" b="0" i="0" u="none" strike="noStrike" cap="none">
-                <a:solidFill>
-                  <a:srgbClr val="1B1B1B"/>
-                </a:solidFill>
-                <a:latin typeface="Montserrat Medium"/>
-                <a:ea typeface="Montserrat Medium"/>
-                <a:cs typeface="Montserrat Medium"/>
-                <a:sym typeface="Montserrat Medium"/>
-              </a:rPr>
-              <a:t>Preguntas</a:t>
-            </a:r>
-            <a:endParaRPr sz="1400" b="0" i="0" u="none" strike="noStrike" cap="none">
-              <a:solidFill>
-                <a:srgbClr val="1B1B1B"/>
-              </a:solidFill>
-              <a:latin typeface="Montserrat Medium"/>
-              <a:ea typeface="Montserrat Medium"/>
-              <a:cs typeface="Montserrat Medium"/>
-              <a:sym typeface="Montserrat Medium"/>
-            </a:endParaRPr>
-          </a:p>
-          <a:p>
-            <a:pPr marL="0" marR="0" lvl="0" indent="0" algn="l" rtl="0">
-              <a:lnSpc>
-                <a:spcPct val="150000"/>
-              </a:lnSpc>
-              <a:spcBef>
-                <a:spcPts val="0"/>
-              </a:spcBef>
-              <a:spcAft>
-                <a:spcPts val="0"/>
-              </a:spcAft>
-              <a:buClr>
-                <a:srgbClr val="000000"/>
-              </a:buClr>
-              <a:buSzPts val="1400"/>
-              <a:buFont typeface="Arial"/>
-              <a:buNone/>
-            </a:pPr>
-            <a:r>
-              <a:rPr lang="es-ES" sz="1400" b="1" i="0" u="none" strike="noStrike" cap="none">
-                <a:solidFill>
-                  <a:srgbClr val="026FC0"/>
-                </a:solidFill>
-                <a:latin typeface="Montserrat"/>
-                <a:ea typeface="Montserrat"/>
-                <a:cs typeface="Montserrat"/>
-                <a:sym typeface="Montserrat"/>
-              </a:rPr>
-              <a:t>7.</a:t>
-            </a:r>
-            <a:r>
-              <a:rPr lang="es-ES" sz="1400" b="0" i="0" u="none" strike="noStrike" cap="none">
-                <a:solidFill>
-                  <a:srgbClr val="1B1B1B"/>
-                </a:solidFill>
-                <a:latin typeface="Montserrat Medium"/>
-                <a:ea typeface="Montserrat Medium"/>
-                <a:cs typeface="Montserrat Medium"/>
-                <a:sym typeface="Montserrat Medium"/>
-              </a:rPr>
-              <a:t>   Anexo I - Pantallazos de la aplicación</a:t>
-            </a:r>
-            <a:endParaRPr sz="1400" b="0" i="0" u="none" strike="noStrike" cap="none">
-              <a:solidFill>
-                <a:srgbClr val="1B1B1B"/>
-              </a:solidFill>
-              <a:latin typeface="Montserrat Medium"/>
-              <a:ea typeface="Montserrat Medium"/>
-              <a:cs typeface="Montserrat Medium"/>
-              <a:sym typeface="Montserrat Medium"/>
-            </a:endParaRPr>
-          </a:p>
-          <a:p>
-            <a:pPr marL="0" marR="0" lvl="0" indent="0" algn="l" rtl="0">
-              <a:lnSpc>
-                <a:spcPct val="150000"/>
-              </a:lnSpc>
-              <a:spcBef>
-                <a:spcPts val="0"/>
-              </a:spcBef>
-              <a:spcAft>
-                <a:spcPts val="0"/>
-              </a:spcAft>
-              <a:buClr>
-                <a:srgbClr val="000000"/>
-              </a:buClr>
-              <a:buSzPts val="1400"/>
-              <a:buFont typeface="Arial"/>
-              <a:buNone/>
-            </a:pPr>
-            <a:endParaRPr sz="1400" b="0" i="0" u="none" strike="noStrike" cap="none">
-              <a:solidFill>
-                <a:srgbClr val="1B1B1B"/>
-              </a:solidFill>
-              <a:latin typeface="Montserrat Medium"/>
-              <a:ea typeface="Montserrat Medium"/>
-              <a:cs typeface="Montserrat Medium"/>
-              <a:sym typeface="Montserrat Medium"/>
-            </a:endParaRPr>
-          </a:p>
-        </p:txBody>
-      </p:sp>
-      <p:sp>
-        <p:nvSpPr>
-          <p:cNvPr id="174" name="Google Shape;174;p2"/>
-          <p:cNvSpPr txBox="1"/>
-          <p:nvPr/>
-        </p:nvSpPr>
-        <p:spPr>
-          <a:xfrm>
-            <a:off x="537975" y="1336900"/>
-            <a:ext cx="2316900" cy="392400"/>
-          </a:xfrm>
-          <a:prstGeom prst="rect">
-            <a:avLst/>
-          </a:prstGeom>
-          <a:noFill/>
-          <a:ln>
-            <a:noFill/>
-          </a:ln>
-        </p:spPr>
-        <p:txBody>
-          <a:bodyPr spcFirstLastPara="1" wrap="square" lIns="91425" tIns="91425" rIns="91425" bIns="91425" anchor="ctr" anchorCtr="0">
-            <a:noAutofit/>
-          </a:bodyPr>
-          <a:lstStyle/>
-          <a:p>
-            <a:pPr marL="0" marR="0" lvl="0" indent="0" algn="l" rtl="0">
-              <a:lnSpc>
-                <a:spcPct val="115000"/>
-              </a:lnSpc>
-              <a:spcBef>
-                <a:spcPts val="0"/>
-              </a:spcBef>
-              <a:spcAft>
-                <a:spcPts val="0"/>
-              </a:spcAft>
-              <a:buClr>
-                <a:srgbClr val="000000"/>
-              </a:buClr>
-              <a:buSzPts val="1800"/>
-              <a:buFont typeface="Arial"/>
-              <a:buNone/>
-            </a:pPr>
-            <a:r>
-              <a:rPr lang="es-ES" sz="1600" b="1" i="0" u="none" strike="noStrike" cap="none">
-                <a:solidFill>
-                  <a:srgbClr val="1B1B1B"/>
-                </a:solidFill>
-                <a:latin typeface="Montserrat"/>
-                <a:ea typeface="Montserrat"/>
-                <a:cs typeface="Montserrat"/>
-                <a:sym typeface="Montserrat"/>
-              </a:rPr>
-              <a:t>Índice</a:t>
-            </a:r>
-            <a:endParaRPr sz="1600" b="1" i="0" u="none" strike="noStrike" cap="none">
-              <a:solidFill>
-                <a:srgbClr val="026FC1"/>
-              </a:solidFill>
-              <a:latin typeface="Montserrat"/>
-              <a:ea typeface="Montserrat"/>
-              <a:cs typeface="Montserrat"/>
-              <a:sym typeface="Montserrat"/>
-            </a:endParaRPr>
-          </a:p>
-        </p:txBody>
-      </p:sp>
     </p:spTree>
   </p:cSld>
   <p:clrMapOvr>
@@ -20323,17 +20434,6 @@
 </file>
 
 <file path=customXml/item2.xml><?xml version="1.0" encoding="utf-8"?>
-<p:properties xmlns:p="http://schemas.microsoft.com/office/2006/metadata/properties" xmlns:xsi="http://www.w3.org/2001/XMLSchema-instance" xmlns:pc="http://schemas.microsoft.com/office/infopath/2007/PartnerControls">
-  <documentManagement>
-    <TaxCatchAll xmlns="25c9aa0c-2f37-4ce1-bf75-107ed0157c9a" xsi:nil="true"/>
-    <lcf76f155ced4ddcb4097134ff3c332f xmlns="07cdf306-c8c7-4c1f-bba6-c3c6dc66de69">
-      <Terms xmlns="http://schemas.microsoft.com/office/infopath/2007/PartnerControls"/>
-    </lcf76f155ced4ddcb4097134ff3c332f>
-  </documentManagement>
-</p:properties>
-</file>
-
-<file path=customXml/item3.xml><?xml version="1.0" encoding="utf-8"?>
 <ct:contentTypeSchema xmlns:ct="http://schemas.microsoft.com/office/2006/metadata/contentType" xmlns:ma="http://schemas.microsoft.com/office/2006/metadata/properties/metaAttributes" ct:_="" ma:_="" ma:contentTypeName="Documento" ma:contentTypeID="0x010100908D284D8C7B74469E3B7FA080DF97DC" ma:contentTypeVersion="13" ma:contentTypeDescription="Crear nuevo documento." ma:contentTypeScope="" ma:versionID="0bfd5c21aaf54785fef1586b3bf511f1">
   <xsd:schema xmlns:xsd="http://www.w3.org/2001/XMLSchema" xmlns:xs="http://www.w3.org/2001/XMLSchema" xmlns:p="http://schemas.microsoft.com/office/2006/metadata/properties" xmlns:ns2="25c9aa0c-2f37-4ce1-bf75-107ed0157c9a" xmlns:ns3="07cdf306-c8c7-4c1f-bba6-c3c6dc66de69" targetNamespace="http://schemas.microsoft.com/office/2006/metadata/properties" ma:root="true" ma:fieldsID="f2e7896940e0d411d07d9fbfe266fc4d" ns2:_="" ns3:_="">
     <xsd:import namespace="25c9aa0c-2f37-4ce1-bf75-107ed0157c9a"/>
@@ -20540,6 +20640,17 @@
 </ct:contentTypeSchema>
 </file>
 
+<file path=customXml/item3.xml><?xml version="1.0" encoding="utf-8"?>
+<p:properties xmlns:p="http://schemas.microsoft.com/office/2006/metadata/properties" xmlns:xsi="http://www.w3.org/2001/XMLSchema-instance" xmlns:pc="http://schemas.microsoft.com/office/infopath/2007/PartnerControls">
+  <documentManagement>
+    <TaxCatchAll xmlns="25c9aa0c-2f37-4ce1-bf75-107ed0157c9a" xsi:nil="true"/>
+    <lcf76f155ced4ddcb4097134ff3c332f xmlns="07cdf306-c8c7-4c1f-bba6-c3c6dc66de69">
+      <Terms xmlns="http://schemas.microsoft.com/office/infopath/2007/PartnerControls"/>
+    </lcf76f155ced4ddcb4097134ff3c332f>
+  </documentManagement>
+</p:properties>
+</file>
+
 <file path=customXml/itemProps1.xml><?xml version="1.0" encoding="utf-8"?>
 <ds:datastoreItem xmlns:ds="http://schemas.openxmlformats.org/officeDocument/2006/customXml" ds:itemID="{BAB4ED58-061A-4E6D-A768-9E26D7F95927}">
   <ds:schemaRefs>
@@ -20549,23 +20660,6 @@
 </file>
 
 <file path=customXml/itemProps2.xml><?xml version="1.0" encoding="utf-8"?>
-<ds:datastoreItem xmlns:ds="http://schemas.openxmlformats.org/officeDocument/2006/customXml" ds:itemID="{1623C4EA-61D3-41CC-9ECA-38BEB6FF5D59}">
-  <ds:schemaRefs>
-    <ds:schemaRef ds:uri="25c9aa0c-2f37-4ce1-bf75-107ed0157c9a"/>
-    <ds:schemaRef ds:uri="http://purl.org/dc/dcmitype/"/>
-    <ds:schemaRef ds:uri="http://schemas.microsoft.com/office/2006/documentManagement/types"/>
-    <ds:schemaRef ds:uri="http://purl.org/dc/terms/"/>
-    <ds:schemaRef ds:uri="http://www.w3.org/XML/1998/namespace"/>
-    <ds:schemaRef ds:uri="07cdf306-c8c7-4c1f-bba6-c3c6dc66de69"/>
-    <ds:schemaRef ds:uri="http://schemas.microsoft.com/office/infopath/2007/PartnerControls"/>
-    <ds:schemaRef ds:uri="http://purl.org/dc/elements/1.1/"/>
-    <ds:schemaRef ds:uri="http://schemas.openxmlformats.org/package/2006/metadata/core-properties"/>
-    <ds:schemaRef ds:uri="http://schemas.microsoft.com/office/2006/metadata/properties"/>
-  </ds:schemaRefs>
-</ds:datastoreItem>
-</file>
-
-<file path=customXml/itemProps3.xml><?xml version="1.0" encoding="utf-8"?>
 <ds:datastoreItem xmlns:ds="http://schemas.openxmlformats.org/officeDocument/2006/customXml" ds:itemID="{7FD7A396-0F7E-40A3-A5A0-6081F2C46E63}">
   <ds:schemaRefs>
     <ds:schemaRef ds:uri="http://schemas.microsoft.com/office/2006/metadata/contentType"/>
@@ -20582,4 +20676,21 @@
     <ds:schemaRef ds:uri="http://schemas.microsoft.com/internal/obd"/>
   </ds:schemaRefs>
 </ds:datastoreItem>
+</file>
+
+<file path=customXml/itemProps3.xml><?xml version="1.0" encoding="utf-8"?>
+<ds:datastoreItem xmlns:ds="http://schemas.openxmlformats.org/officeDocument/2006/customXml" ds:itemID="{1623C4EA-61D3-41CC-9ECA-38BEB6FF5D59}">
+  <ds:schemaRefs>
+    <ds:schemaRef ds:uri="25c9aa0c-2f37-4ce1-bf75-107ed0157c9a"/>
+    <ds:schemaRef ds:uri="http://purl.org/dc/dcmitype/"/>
+    <ds:schemaRef ds:uri="http://schemas.microsoft.com/office/2006/documentManagement/types"/>
+    <ds:schemaRef ds:uri="http://purl.org/dc/terms/"/>
+    <ds:schemaRef ds:uri="http://www.w3.org/XML/1998/namespace"/>
+    <ds:schemaRef ds:uri="07cdf306-c8c7-4c1f-bba6-c3c6dc66de69"/>
+    <ds:schemaRef ds:uri="http://schemas.microsoft.com/office/infopath/2007/PartnerControls"/>
+    <ds:schemaRef ds:uri="http://purl.org/dc/elements/1.1/"/>
+    <ds:schemaRef ds:uri="http://schemas.openxmlformats.org/package/2006/metadata/core-properties"/>
+    <ds:schemaRef ds:uri="http://schemas.microsoft.com/office/2006/metadata/properties"/>
+  </ds:schemaRefs>
+</ds:datastoreItem>
 </file>
</xml_diff>